<commit_message>
doc/3_ 설계서/UI Design 설계서.pptx UI Design 설계서_4_tuna_박근혜_20170521_01 메인 화면, 과목 관리 화면 UI Design 작성
</commit_message>
<xml_diff>
--- a/doc/3_ 설계서/UI Design 설계서.pptx
+++ b/doc/3_ 설계서/UI Design 설계서.pptx
@@ -155,6 +155,41 @@
       </a:defRPr>
     </a:lvl9pPr>
   </p:defaultTextStyle>
+  <p:extLst>
+    <p:ext uri="{EFAFB233-063F-42B5-8137-9DF3F51BA10A}">
+      <p15:sldGuideLst xmlns:p15="http://schemas.microsoft.com/office/powerpoint/2012/main">
+        <p15:guide id="1" orient="horz">
+          <p15:clr>
+            <a:srgbClr val="A4A3A4"/>
+          </p15:clr>
+        </p15:guide>
+        <p15:guide id="2" pos="2880">
+          <p15:clr>
+            <a:srgbClr val="A4A3A4"/>
+          </p15:clr>
+        </p15:guide>
+        <p15:guide id="3" pos="6">
+          <p15:clr>
+            <a:srgbClr val="A4A3A4"/>
+          </p15:clr>
+        </p15:guide>
+      </p15:sldGuideLst>
+    </p:ext>
+    <p:ext uri="{2D200454-40CA-4A62-9FC3-DE9A4176ACB9}">
+      <p15:notesGuideLst xmlns:p15="http://schemas.microsoft.com/office/powerpoint/2012/main">
+        <p15:guide id="1" orient="horz" pos="3126">
+          <p15:clr>
+            <a:srgbClr val="A4A3A4"/>
+          </p15:clr>
+        </p15:guide>
+        <p15:guide id="2" pos="2140">
+          <p15:clr>
+            <a:srgbClr val="A4A3A4"/>
+          </p15:clr>
+        </p15:guide>
+      </p15:notesGuideLst>
+    </p:ext>
+  </p:extLst>
 </p:presentation>
 </file>
 
@@ -375,7 +410,7 @@
     </p:spTree>
     <p:extLst>
       <p:ext uri="{BB962C8B-B14F-4D97-AF65-F5344CB8AC3E}">
-        <p14:creationId xmlns="" xmlns:p14="http://schemas.microsoft.com/office/powerpoint/2010/main" val="1946093107"/>
+        <p14:creationId xmlns:p14="http://schemas.microsoft.com/office/powerpoint/2010/main" val="1946093107"/>
       </p:ext>
     </p:extLst>
   </p:cSld>
@@ -701,7 +736,7 @@
     </p:spTree>
     <p:extLst>
       <p:ext uri="{BB962C8B-B14F-4D97-AF65-F5344CB8AC3E}">
-        <p14:creationId xmlns="" xmlns:p14="http://schemas.microsoft.com/office/powerpoint/2010/main" val="2972200889"/>
+        <p14:creationId xmlns:p14="http://schemas.microsoft.com/office/powerpoint/2010/main" val="2972200889"/>
       </p:ext>
     </p:extLst>
   </p:cSld>
@@ -829,6 +864,176 @@
     </a:lvl9pPr>
   </p:notesStyle>
 </p:notesMaster>
+</file>
+
+<file path=ppt/notesSlides/notesSlide1.xml><?xml version="1.0" encoding="utf-8"?>
+<p:notes xmlns:a="http://schemas.openxmlformats.org/drawingml/2006/main" xmlns:r="http://schemas.openxmlformats.org/officeDocument/2006/relationships" xmlns:p="http://schemas.openxmlformats.org/presentationml/2006/main">
+  <p:cSld>
+    <p:spTree>
+      <p:nvGrpSpPr>
+        <p:cNvPr id="1" name=""/>
+        <p:cNvGrpSpPr/>
+        <p:nvPr/>
+      </p:nvGrpSpPr>
+      <p:grpSpPr>
+        <a:xfrm>
+          <a:off x="0" y="0"/>
+          <a:ext cx="0" cy="0"/>
+          <a:chOff x="0" y="0"/>
+          <a:chExt cx="0" cy="0"/>
+        </a:xfrm>
+      </p:grpSpPr>
+      <p:sp>
+        <p:nvSpPr>
+          <p:cNvPr id="2" name="슬라이드 이미지 개체 틀 1"/>
+          <p:cNvSpPr>
+            <a:spLocks noGrp="1" noRot="1" noChangeAspect="1"/>
+          </p:cNvSpPr>
+          <p:nvPr>
+            <p:ph type="sldImg"/>
+          </p:nvPr>
+        </p:nvSpPr>
+        <p:spPr/>
+      </p:sp>
+      <p:sp>
+        <p:nvSpPr>
+          <p:cNvPr id="3" name="슬라이드 노트 개체 틀 2"/>
+          <p:cNvSpPr>
+            <a:spLocks noGrp="1"/>
+          </p:cNvSpPr>
+          <p:nvPr>
+            <p:ph type="body" idx="1"/>
+          </p:nvPr>
+        </p:nvSpPr>
+        <p:spPr/>
+        <p:txBody>
+          <a:bodyPr/>
+          <a:lstStyle/>
+          <a:p>
+            <a:endParaRPr lang="ko-KR" altLang="en-US" dirty="0"/>
+          </a:p>
+        </p:txBody>
+      </p:sp>
+      <p:sp>
+        <p:nvSpPr>
+          <p:cNvPr id="4" name="슬라이드 번호 개체 틀 3"/>
+          <p:cNvSpPr>
+            <a:spLocks noGrp="1"/>
+          </p:cNvSpPr>
+          <p:nvPr>
+            <p:ph type="sldNum" sz="quarter" idx="10"/>
+          </p:nvPr>
+        </p:nvSpPr>
+        <p:spPr/>
+        <p:txBody>
+          <a:bodyPr/>
+          <a:lstStyle/>
+          <a:p>
+            <a:fld id="{379E618C-E705-4CD1-A19E-88052652622A}" type="slidenum">
+              <a:rPr lang="en-US" smtClean="0"/>
+              <a:pPr/>
+              <a:t>7</a:t>
+            </a:fld>
+            <a:endParaRPr lang="en-US"/>
+          </a:p>
+        </p:txBody>
+      </p:sp>
+    </p:spTree>
+    <p:extLst>
+      <p:ext uri="{BB962C8B-B14F-4D97-AF65-F5344CB8AC3E}">
+        <p14:creationId xmlns:p14="http://schemas.microsoft.com/office/powerpoint/2010/main" val="3902742119"/>
+      </p:ext>
+    </p:extLst>
+  </p:cSld>
+  <p:clrMapOvr>
+    <a:masterClrMapping/>
+  </p:clrMapOvr>
+</p:notes>
+</file>
+
+<file path=ppt/notesSlides/notesSlide2.xml><?xml version="1.0" encoding="utf-8"?>
+<p:notes xmlns:a="http://schemas.openxmlformats.org/drawingml/2006/main" xmlns:r="http://schemas.openxmlformats.org/officeDocument/2006/relationships" xmlns:p="http://schemas.openxmlformats.org/presentationml/2006/main">
+  <p:cSld>
+    <p:spTree>
+      <p:nvGrpSpPr>
+        <p:cNvPr id="1" name=""/>
+        <p:cNvGrpSpPr/>
+        <p:nvPr/>
+      </p:nvGrpSpPr>
+      <p:grpSpPr>
+        <a:xfrm>
+          <a:off x="0" y="0"/>
+          <a:ext cx="0" cy="0"/>
+          <a:chOff x="0" y="0"/>
+          <a:chExt cx="0" cy="0"/>
+        </a:xfrm>
+      </p:grpSpPr>
+      <p:sp>
+        <p:nvSpPr>
+          <p:cNvPr id="2" name="슬라이드 이미지 개체 틀 1"/>
+          <p:cNvSpPr>
+            <a:spLocks noGrp="1" noRot="1" noChangeAspect="1"/>
+          </p:cNvSpPr>
+          <p:nvPr>
+            <p:ph type="sldImg"/>
+          </p:nvPr>
+        </p:nvSpPr>
+        <p:spPr/>
+      </p:sp>
+      <p:sp>
+        <p:nvSpPr>
+          <p:cNvPr id="3" name="슬라이드 노트 개체 틀 2"/>
+          <p:cNvSpPr>
+            <a:spLocks noGrp="1"/>
+          </p:cNvSpPr>
+          <p:nvPr>
+            <p:ph type="body" idx="1"/>
+          </p:nvPr>
+        </p:nvSpPr>
+        <p:spPr/>
+        <p:txBody>
+          <a:bodyPr/>
+          <a:lstStyle/>
+          <a:p>
+            <a:endParaRPr lang="ko-KR" altLang="en-US" dirty="0"/>
+          </a:p>
+        </p:txBody>
+      </p:sp>
+      <p:sp>
+        <p:nvSpPr>
+          <p:cNvPr id="4" name="슬라이드 번호 개체 틀 3"/>
+          <p:cNvSpPr>
+            <a:spLocks noGrp="1"/>
+          </p:cNvSpPr>
+          <p:nvPr>
+            <p:ph type="sldNum" sz="quarter" idx="10"/>
+          </p:nvPr>
+        </p:nvSpPr>
+        <p:spPr/>
+        <p:txBody>
+          <a:bodyPr/>
+          <a:lstStyle/>
+          <a:p>
+            <a:fld id="{379E618C-E705-4CD1-A19E-88052652622A}" type="slidenum">
+              <a:rPr lang="en-US" smtClean="0"/>
+              <a:pPr/>
+              <a:t>8</a:t>
+            </a:fld>
+            <a:endParaRPr lang="en-US"/>
+          </a:p>
+        </p:txBody>
+      </p:sp>
+    </p:spTree>
+    <p:extLst>
+      <p:ext uri="{BB962C8B-B14F-4D97-AF65-F5344CB8AC3E}">
+        <p14:creationId xmlns:p14="http://schemas.microsoft.com/office/powerpoint/2010/main" val="2792049845"/>
+      </p:ext>
+    </p:extLst>
+  </p:cSld>
+  <p:clrMapOvr>
+    <a:masterClrMapping/>
+  </p:clrMapOvr>
+</p:notes>
 </file>
 
 <file path=ppt/slideLayouts/slideLayout1.xml><?xml version="1.0" encoding="utf-8"?>
@@ -2760,7 +2965,7 @@
           <p:nvPr>
             <p:extLst>
               <p:ext uri="{D42A27DB-BD31-4B8C-83A1-F6EECF244321}">
-                <p14:modId xmlns:p14="http://schemas.microsoft.com/office/powerpoint/2010/main" xmlns="" val="91936271"/>
+                <p14:modId xmlns:p14="http://schemas.microsoft.com/office/powerpoint/2010/main" val="3960473027"/>
               </p:ext>
             </p:extLst>
           </p:nvPr>
@@ -3881,6 +4086,7 @@
                         <a:buFontTx/>
                         <a:buNone/>
                         <a:tabLst/>
+                        <a:defRPr/>
                       </a:pPr>
                       <a:r>
                         <a:rPr kumimoji="1" lang="en-US" altLang="ko-KR" sz="1000" b="0" i="0" u="none" strike="noStrike" cap="none" normalizeH="0" baseline="0" dirty="0" smtClean="0">
@@ -3894,7 +4100,7 @@
                           <a:latin typeface="맑은 고딕" pitchFamily="50" charset="-127"/>
                           <a:ea typeface="맑은 고딕" pitchFamily="50" charset="-127"/>
                         </a:rPr>
-                        <a:t>20170520_01</a:t>
+                        <a:t>20170521_01</a:t>
                       </a:r>
                       <a:endParaRPr kumimoji="1" lang="ko-KR" altLang="ko-KR" sz="1000" b="0" i="0" u="none" strike="noStrike" cap="none" normalizeH="0" baseline="0" dirty="0" smtClean="0">
                         <a:ln>
@@ -4485,7 +4691,7 @@
           <p:nvPr>
             <p:extLst>
               <p:ext uri="{D42A27DB-BD31-4B8C-83A1-F6EECF244321}">
-                <p14:modId xmlns:p14="http://schemas.microsoft.com/office/powerpoint/2010/main" xmlns="" val="1127966868"/>
+                <p14:modId xmlns:p14="http://schemas.microsoft.com/office/powerpoint/2010/main" val="1127966868"/>
               </p:ext>
             </p:extLst>
           </p:nvPr>
@@ -7944,7 +8150,7 @@
     </p:spTree>
     <p:extLst>
       <p:ext uri="{BB962C8B-B14F-4D97-AF65-F5344CB8AC3E}">
-        <p14:creationId xmlns:p14="http://schemas.microsoft.com/office/powerpoint/2010/main" xmlns="" val="83292215"/>
+        <p14:creationId xmlns:p14="http://schemas.microsoft.com/office/powerpoint/2010/main" val="83292215"/>
       </p:ext>
     </p:extLst>
   </p:cSld>
@@ -8660,7 +8866,7 @@
           <p:nvPr>
             <p:extLst>
               <p:ext uri="{D42A27DB-BD31-4B8C-83A1-F6EECF244321}">
-                <p14:modId xmlns:p14="http://schemas.microsoft.com/office/powerpoint/2010/main" xmlns="" val="91936271"/>
+                <p14:modId xmlns:p14="http://schemas.microsoft.com/office/powerpoint/2010/main" val="2387955933"/>
               </p:ext>
             </p:extLst>
           </p:nvPr>
@@ -9753,6 +9959,7 @@
                         <a:buFontTx/>
                         <a:buNone/>
                         <a:tabLst/>
+                        <a:defRPr/>
                       </a:pPr>
                       <a:r>
                         <a:rPr kumimoji="1" lang="en-US" altLang="ko-KR" sz="1000" b="0" i="0" u="none" strike="noStrike" cap="none" normalizeH="0" baseline="0" dirty="0" smtClean="0">
@@ -9766,7 +9973,7 @@
                           <a:latin typeface="맑은 고딕" pitchFamily="50" charset="-127"/>
                           <a:ea typeface="맑은 고딕" pitchFamily="50" charset="-127"/>
                         </a:rPr>
-                        <a:t>20170520_01</a:t>
+                        <a:t>20170521_01</a:t>
                       </a:r>
                       <a:endParaRPr kumimoji="1" lang="ko-KR" altLang="ko-KR" sz="1000" b="0" i="0" u="none" strike="noStrike" cap="none" normalizeH="0" baseline="0" dirty="0" smtClean="0">
                         <a:ln>
@@ -10491,7 +10698,7 @@
     </p:spTree>
     <p:extLst>
       <p:ext uri="{BB962C8B-B14F-4D97-AF65-F5344CB8AC3E}">
-        <p14:creationId xmlns:p14="http://schemas.microsoft.com/office/powerpoint/2010/main" xmlns="" val="4072035316"/>
+        <p14:creationId xmlns:p14="http://schemas.microsoft.com/office/powerpoint/2010/main" val="4072035316"/>
       </p:ext>
     </p:extLst>
   </p:cSld>
@@ -10661,7 +10868,7 @@
           <p:nvPr>
             <p:extLst>
               <p:ext uri="{D42A27DB-BD31-4B8C-83A1-F6EECF244321}">
-                <p14:modId xmlns:p14="http://schemas.microsoft.com/office/powerpoint/2010/main" xmlns="" val="91936271"/>
+                <p14:modId xmlns:p14="http://schemas.microsoft.com/office/powerpoint/2010/main" val="1885943543"/>
               </p:ext>
             </p:extLst>
           </p:nvPr>
@@ -11754,6 +11961,7 @@
                         <a:buFontTx/>
                         <a:buNone/>
                         <a:tabLst/>
+                        <a:defRPr/>
                       </a:pPr>
                       <a:r>
                         <a:rPr kumimoji="1" lang="en-US" altLang="ko-KR" sz="1000" b="0" i="0" u="none" strike="noStrike" cap="none" normalizeH="0" baseline="0" dirty="0" smtClean="0">
@@ -11767,7 +11975,7 @@
                           <a:latin typeface="맑은 고딕" pitchFamily="50" charset="-127"/>
                           <a:ea typeface="맑은 고딕" pitchFamily="50" charset="-127"/>
                         </a:rPr>
-                        <a:t>20170520_01</a:t>
+                        <a:t>20170521_01</a:t>
                       </a:r>
                       <a:endParaRPr kumimoji="1" lang="ko-KR" altLang="ko-KR" sz="1000" b="0" i="0" u="none" strike="noStrike" cap="none" normalizeH="0" baseline="0" dirty="0" smtClean="0">
                         <a:ln>
@@ -12396,7 +12604,7 @@
           <p:nvPr>
             <p:extLst>
               <p:ext uri="{D42A27DB-BD31-4B8C-83A1-F6EECF244321}">
-                <p14:modId xmlns:p14="http://schemas.microsoft.com/office/powerpoint/2010/main" xmlns="" val="1127966868"/>
+                <p14:modId xmlns:p14="http://schemas.microsoft.com/office/powerpoint/2010/main" val="1127966868"/>
               </p:ext>
             </p:extLst>
           </p:nvPr>
@@ -12873,7 +13081,7 @@
     </p:spTree>
     <p:extLst>
       <p:ext uri="{BB962C8B-B14F-4D97-AF65-F5344CB8AC3E}">
-        <p14:creationId xmlns:p14="http://schemas.microsoft.com/office/powerpoint/2010/main" xmlns="" val="83292215"/>
+        <p14:creationId xmlns:p14="http://schemas.microsoft.com/office/powerpoint/2010/main" val="83292215"/>
       </p:ext>
     </p:extLst>
   </p:cSld>
@@ -14228,7 +14436,7 @@
           <p:nvPr>
             <p:extLst>
               <p:ext uri="{D42A27DB-BD31-4B8C-83A1-F6EECF244321}">
-                <p14:modId xmlns:p14="http://schemas.microsoft.com/office/powerpoint/2010/main" xmlns="" val="91936271"/>
+                <p14:modId xmlns:p14="http://schemas.microsoft.com/office/powerpoint/2010/main" val="2778506299"/>
               </p:ext>
             </p:extLst>
           </p:nvPr>
@@ -15349,6 +15557,7 @@
                         <a:buFontTx/>
                         <a:buNone/>
                         <a:tabLst/>
+                        <a:defRPr/>
                       </a:pPr>
                       <a:r>
                         <a:rPr kumimoji="1" lang="en-US" altLang="ko-KR" sz="900" b="0" i="0" u="none" strike="noStrike" cap="none" normalizeH="0" baseline="0" dirty="0" smtClean="0">
@@ -15362,7 +15571,7 @@
                           <a:latin typeface="맑은 고딕" pitchFamily="50" charset="-127"/>
                           <a:ea typeface="맑은 고딕" pitchFamily="50" charset="-127"/>
                         </a:rPr>
-                        <a:t>20170520_01</a:t>
+                        <a:t>20170521_01</a:t>
                       </a:r>
                       <a:endParaRPr kumimoji="1" lang="ko-KR" altLang="ko-KR" sz="900" b="0" i="0" u="none" strike="noStrike" cap="none" normalizeH="0" baseline="0" dirty="0" smtClean="0">
                         <a:ln>
@@ -16087,7 +16296,7 @@
     </p:spTree>
     <p:extLst>
       <p:ext uri="{BB962C8B-B14F-4D97-AF65-F5344CB8AC3E}">
-        <p14:creationId xmlns:p14="http://schemas.microsoft.com/office/powerpoint/2010/main" xmlns="" val="4072035316"/>
+        <p14:creationId xmlns:p14="http://schemas.microsoft.com/office/powerpoint/2010/main" val="4072035316"/>
       </p:ext>
     </p:extLst>
   </p:cSld>
@@ -16572,7 +16781,7 @@
           <p:nvPr>
             <p:extLst>
               <p:ext uri="{D42A27DB-BD31-4B8C-83A1-F6EECF244321}">
-                <p14:modId xmlns:p14="http://schemas.microsoft.com/office/powerpoint/2010/main" xmlns="" val="91936271"/>
+                <p14:modId xmlns:p14="http://schemas.microsoft.com/office/powerpoint/2010/main" val="2781598748"/>
               </p:ext>
             </p:extLst>
           </p:nvPr>
@@ -17693,6 +17902,7 @@
                         <a:buFontTx/>
                         <a:buNone/>
                         <a:tabLst/>
+                        <a:defRPr/>
                       </a:pPr>
                       <a:r>
                         <a:rPr kumimoji="1" lang="en-US" altLang="ko-KR" sz="1000" b="0" i="0" u="none" strike="noStrike" cap="none" normalizeH="0" baseline="0" dirty="0" smtClean="0">
@@ -17706,7 +17916,7 @@
                           <a:latin typeface="맑은 고딕" pitchFamily="50" charset="-127"/>
                           <a:ea typeface="맑은 고딕" pitchFamily="50" charset="-127"/>
                         </a:rPr>
-                        <a:t>20170520_01</a:t>
+                        <a:t>20170521_01</a:t>
                       </a:r>
                       <a:endParaRPr kumimoji="1" lang="ko-KR" altLang="ko-KR" sz="1000" b="0" i="0" u="none" strike="noStrike" cap="none" normalizeH="0" baseline="0" dirty="0" smtClean="0">
                         <a:ln>
@@ -18308,7 +18518,7 @@
           <p:nvPr>
             <p:extLst>
               <p:ext uri="{D42A27DB-BD31-4B8C-83A1-F6EECF244321}">
-                <p14:modId xmlns:p14="http://schemas.microsoft.com/office/powerpoint/2010/main" xmlns="" val="1127966868"/>
+                <p14:modId xmlns:p14="http://schemas.microsoft.com/office/powerpoint/2010/main" val="1127966868"/>
               </p:ext>
             </p:extLst>
           </p:nvPr>
@@ -20402,7 +20612,7 @@
     </p:spTree>
     <p:extLst>
       <p:ext uri="{BB962C8B-B14F-4D97-AF65-F5344CB8AC3E}">
-        <p14:creationId xmlns:p14="http://schemas.microsoft.com/office/powerpoint/2010/main" xmlns="" val="83292215"/>
+        <p14:creationId xmlns:p14="http://schemas.microsoft.com/office/powerpoint/2010/main" val="83292215"/>
       </p:ext>
     </p:extLst>
   </p:cSld>
@@ -21100,7 +21310,7 @@
           <p:nvPr>
             <p:extLst>
               <p:ext uri="{D42A27DB-BD31-4B8C-83A1-F6EECF244321}">
-                <p14:modId xmlns:p14="http://schemas.microsoft.com/office/powerpoint/2010/main" xmlns="" val="91936271"/>
+                <p14:modId xmlns:p14="http://schemas.microsoft.com/office/powerpoint/2010/main" val="1009342157"/>
               </p:ext>
             </p:extLst>
           </p:nvPr>
@@ -22193,6 +22403,7 @@
                         <a:buFontTx/>
                         <a:buNone/>
                         <a:tabLst/>
+                        <a:defRPr/>
                       </a:pPr>
                       <a:r>
                         <a:rPr kumimoji="1" lang="en-US" altLang="ko-KR" sz="1000" b="0" i="0" u="none" strike="noStrike" cap="none" normalizeH="0" baseline="0" dirty="0" smtClean="0">
@@ -22206,7 +22417,7 @@
                           <a:latin typeface="맑은 고딕" pitchFamily="50" charset="-127"/>
                           <a:ea typeface="맑은 고딕" pitchFamily="50" charset="-127"/>
                         </a:rPr>
-                        <a:t>20170520_01</a:t>
+                        <a:t>20170521_01</a:t>
                       </a:r>
                       <a:endParaRPr kumimoji="1" lang="ko-KR" altLang="ko-KR" sz="1000" b="0" i="0" u="none" strike="noStrike" cap="none" normalizeH="0" baseline="0" dirty="0" smtClean="0">
                         <a:ln>
@@ -22969,7 +23180,7 @@
     </p:spTree>
     <p:extLst>
       <p:ext uri="{BB962C8B-B14F-4D97-AF65-F5344CB8AC3E}">
-        <p14:creationId xmlns:p14="http://schemas.microsoft.com/office/powerpoint/2010/main" xmlns="" val="4072035316"/>
+        <p14:creationId xmlns:p14="http://schemas.microsoft.com/office/powerpoint/2010/main" val="4072035316"/>
       </p:ext>
     </p:extLst>
   </p:cSld>
@@ -23139,7 +23350,7 @@
           <p:nvPr>
             <p:extLst>
               <p:ext uri="{D42A27DB-BD31-4B8C-83A1-F6EECF244321}">
-                <p14:modId xmlns:p14="http://schemas.microsoft.com/office/powerpoint/2010/main" xmlns="" val="91936271"/>
+                <p14:modId xmlns:p14="http://schemas.microsoft.com/office/powerpoint/2010/main" val="3959226755"/>
               </p:ext>
             </p:extLst>
           </p:nvPr>
@@ -24232,9 +24443,10 @@
                         <a:buFontTx/>
                         <a:buNone/>
                         <a:tabLst/>
+                        <a:defRPr/>
                       </a:pPr>
                       <a:r>
-                        <a:rPr kumimoji="1" lang="en-US" altLang="ko-KR" sz="1000" b="0" i="0" u="none" strike="noStrike" cap="none" normalizeH="0" baseline="0" dirty="0" smtClean="0">
+                        <a:rPr kumimoji="1" lang="en-US" altLang="ko-KR" sz="1000" b="0" i="0" u="none" strike="noStrike" cap="none" normalizeH="0" baseline="0" smtClean="0">
                           <a:ln>
                             <a:noFill/>
                           </a:ln>
@@ -24245,9 +24457,9 @@
                           <a:latin typeface="맑은 고딕" pitchFamily="50" charset="-127"/>
                           <a:ea typeface="맑은 고딕" pitchFamily="50" charset="-127"/>
                         </a:rPr>
-                        <a:t>20170520_01</a:t>
-                      </a:r>
-                      <a:endParaRPr kumimoji="1" lang="ko-KR" altLang="ko-KR" sz="1000" b="0" i="0" u="none" strike="noStrike" cap="none" normalizeH="0" baseline="0" dirty="0" smtClean="0">
+                        <a:t>20170521_01</a:t>
+                      </a:r>
+                      <a:endParaRPr kumimoji="1" lang="ko-KR" altLang="ko-KR" sz="1000" b="0" i="0" u="none" strike="noStrike" cap="none" normalizeH="0" baseline="0" smtClean="0">
                         <a:ln>
                           <a:noFill/>
                         </a:ln>
@@ -24874,7 +25086,7 @@
           <p:nvPr>
             <p:extLst>
               <p:ext uri="{D42A27DB-BD31-4B8C-83A1-F6EECF244321}">
-                <p14:modId xmlns:p14="http://schemas.microsoft.com/office/powerpoint/2010/main" xmlns="" val="1127966868"/>
+                <p14:modId xmlns:p14="http://schemas.microsoft.com/office/powerpoint/2010/main" val="1127966868"/>
               </p:ext>
             </p:extLst>
           </p:nvPr>
@@ -25292,7 +25504,7 @@
     </p:spTree>
     <p:extLst>
       <p:ext uri="{BB962C8B-B14F-4D97-AF65-F5344CB8AC3E}">
-        <p14:creationId xmlns:p14="http://schemas.microsoft.com/office/powerpoint/2010/main" xmlns="" val="83292215"/>
+        <p14:creationId xmlns:p14="http://schemas.microsoft.com/office/powerpoint/2010/main" val="83292215"/>
       </p:ext>
     </p:extLst>
   </p:cSld>
@@ -25352,14 +25564,14 @@
             <p:ph idx="1"/>
             <p:extLst>
               <p:ext uri="{D42A27DB-BD31-4B8C-83A1-F6EECF244321}">
-                <p14:modId xmlns="" xmlns:p14="http://schemas.microsoft.com/office/powerpoint/2010/main" val="3459876744"/>
+                <p14:modId xmlns:p14="http://schemas.microsoft.com/office/powerpoint/2010/main" val="3547661320"/>
               </p:ext>
             </p:extLst>
           </p:nvPr>
         </p:nvGraphicFramePr>
         <p:xfrm>
           <a:off x="280988" y="1025525"/>
-          <a:ext cx="8582024" cy="3235960"/>
+          <a:ext cx="8582024" cy="3322320"/>
         </p:xfrm>
         <a:graphic>
           <a:graphicData uri="http://schemas.openxmlformats.org/drawingml/2006/table">
@@ -26000,27 +26212,16 @@
                     <a:lstStyle/>
                     <a:p>
                       <a:pPr algn="ctr" latinLnBrk="1"/>
-                      <a:endParaRPr lang="ko-KR" altLang="en-US" sz="1200" b="0">
-                        <a:solidFill>
-                          <a:schemeClr val="tx1"/>
-                        </a:solidFill>
-                        <a:latin typeface="맑은 고딕" pitchFamily="50" charset="-127"/>
-                        <a:ea typeface="맑은 고딕" pitchFamily="50" charset="-127"/>
-                      </a:endParaRPr>
-                    </a:p>
-                  </a:txBody>
-                  <a:tcPr anchor="ctr">
-                    <a:solidFill>
-                      <a:schemeClr val="bg1"/>
-                    </a:solidFill>
-                  </a:tcPr>
-                </a:tc>
-                <a:tc>
-                  <a:txBody>
-                    <a:bodyPr/>
-                    <a:lstStyle/>
-                    <a:p>
-                      <a:pPr algn="ctr" latinLnBrk="1"/>
+                      <a:r>
+                        <a:rPr lang="en-US" altLang="ko-KR" sz="1200" b="0" dirty="0" smtClean="0">
+                          <a:solidFill>
+                            <a:schemeClr val="tx1"/>
+                          </a:solidFill>
+                          <a:latin typeface="맑은 고딕" pitchFamily="50" charset="-127"/>
+                          <a:ea typeface="맑은 고딕" pitchFamily="50" charset="-127"/>
+                        </a:rPr>
+                        <a:t>2017.05.21</a:t>
+                      </a:r>
                       <a:endParaRPr lang="ko-KR" altLang="en-US" sz="1200" b="0" dirty="0">
                         <a:solidFill>
                           <a:schemeClr val="tx1"/>
@@ -26042,6 +26243,16 @@
                     <a:lstStyle/>
                     <a:p>
                       <a:pPr algn="ctr" latinLnBrk="1"/>
+                      <a:r>
+                        <a:rPr lang="en-US" altLang="ko-KR" sz="1200" b="0" dirty="0" smtClean="0">
+                          <a:solidFill>
+                            <a:schemeClr val="tx1"/>
+                          </a:solidFill>
+                          <a:latin typeface="맑은 고딕" pitchFamily="50" charset="-127"/>
+                          <a:ea typeface="맑은 고딕" pitchFamily="50" charset="-127"/>
+                        </a:rPr>
+                        <a:t>01</a:t>
+                      </a:r>
                       <a:endParaRPr lang="ko-KR" altLang="en-US" sz="1200" b="0" dirty="0">
                         <a:solidFill>
                           <a:schemeClr val="tx1"/>
@@ -26063,6 +26274,97 @@
                     <a:lstStyle/>
                     <a:p>
                       <a:pPr algn="ctr" latinLnBrk="1"/>
+                      <a:r>
+                        <a:rPr lang="ko-KR" altLang="en-US" sz="1200" b="0" dirty="0" smtClean="0">
+                          <a:solidFill>
+                            <a:schemeClr val="tx1"/>
+                          </a:solidFill>
+                          <a:latin typeface="맑은 고딕" pitchFamily="50" charset="-127"/>
+                          <a:ea typeface="맑은 고딕" pitchFamily="50" charset="-127"/>
+                        </a:rPr>
+                        <a:t>메인 화면</a:t>
+                      </a:r>
+                      <a:r>
+                        <a:rPr lang="en-US" altLang="ko-KR" sz="1200" b="0" dirty="0" smtClean="0">
+                          <a:solidFill>
+                            <a:schemeClr val="tx1"/>
+                          </a:solidFill>
+                          <a:latin typeface="맑은 고딕" pitchFamily="50" charset="-127"/>
+                          <a:ea typeface="맑은 고딕" pitchFamily="50" charset="-127"/>
+                        </a:rPr>
+                        <a:t>, </a:t>
+                      </a:r>
+                      <a:r>
+                        <a:rPr lang="ko-KR" altLang="en-US" sz="1200" b="0" dirty="0" smtClean="0">
+                          <a:solidFill>
+                            <a:schemeClr val="tx1"/>
+                          </a:solidFill>
+                          <a:latin typeface="맑은 고딕" pitchFamily="50" charset="-127"/>
+                          <a:ea typeface="맑은 고딕" pitchFamily="50" charset="-127"/>
+                        </a:rPr>
+                        <a:t>과목 관리 화면 </a:t>
+                      </a:r>
+                      <a:r>
+                        <a:rPr lang="en-US" altLang="ko-KR" sz="1200" b="0" dirty="0" smtClean="0">
+                          <a:solidFill>
+                            <a:schemeClr val="tx1"/>
+                          </a:solidFill>
+                          <a:latin typeface="맑은 고딕" pitchFamily="50" charset="-127"/>
+                          <a:ea typeface="맑은 고딕" pitchFamily="50" charset="-127"/>
+                        </a:rPr>
+                        <a:t>UI Design</a:t>
+                      </a:r>
+                      <a:r>
+                        <a:rPr lang="en-US" altLang="ko-KR" sz="1200" b="0" baseline="0" dirty="0" smtClean="0">
+                          <a:solidFill>
+                            <a:schemeClr val="tx1"/>
+                          </a:solidFill>
+                          <a:latin typeface="맑은 고딕" pitchFamily="50" charset="-127"/>
+                          <a:ea typeface="맑은 고딕" pitchFamily="50" charset="-127"/>
+                        </a:rPr>
+                        <a:t> </a:t>
+                      </a:r>
+                      <a:r>
+                        <a:rPr lang="ko-KR" altLang="en-US" sz="1200" b="0" baseline="0" dirty="0" smtClean="0">
+                          <a:solidFill>
+                            <a:schemeClr val="tx1"/>
+                          </a:solidFill>
+                          <a:latin typeface="맑은 고딕" pitchFamily="50" charset="-127"/>
+                          <a:ea typeface="맑은 고딕" pitchFamily="50" charset="-127"/>
+                        </a:rPr>
+                        <a:t>작성</a:t>
+                      </a:r>
+                      <a:endParaRPr lang="ko-KR" altLang="en-US" sz="1200" b="0" dirty="0">
+                        <a:solidFill>
+                          <a:schemeClr val="tx1"/>
+                        </a:solidFill>
+                        <a:latin typeface="맑은 고딕" pitchFamily="50" charset="-127"/>
+                        <a:ea typeface="맑은 고딕" pitchFamily="50" charset="-127"/>
+                      </a:endParaRPr>
+                    </a:p>
+                  </a:txBody>
+                  <a:tcPr anchor="ctr">
+                    <a:solidFill>
+                      <a:schemeClr val="bg1"/>
+                    </a:solidFill>
+                  </a:tcPr>
+                </a:tc>
+                <a:tc>
+                  <a:txBody>
+                    <a:bodyPr/>
+                    <a:lstStyle/>
+                    <a:p>
+                      <a:pPr algn="ctr" latinLnBrk="1"/>
+                      <a:r>
+                        <a:rPr lang="ko-KR" altLang="en-US" sz="1200" b="0" dirty="0" smtClean="0">
+                          <a:solidFill>
+                            <a:schemeClr val="tx1"/>
+                          </a:solidFill>
+                          <a:latin typeface="맑은 고딕" pitchFamily="50" charset="-127"/>
+                          <a:ea typeface="맑은 고딕" pitchFamily="50" charset="-127"/>
+                        </a:rPr>
+                        <a:t>박근혜</a:t>
+                      </a:r>
                       <a:endParaRPr lang="ko-KR" altLang="en-US" sz="1200" b="0" dirty="0">
                         <a:solidFill>
                           <a:schemeClr val="tx1"/>
@@ -26494,7 +26796,7 @@
     </p:spTree>
     <p:extLst>
       <p:ext uri="{BB962C8B-B14F-4D97-AF65-F5344CB8AC3E}">
-        <p14:creationId xmlns="" xmlns:p14="http://schemas.microsoft.com/office/powerpoint/2010/main" val="2711980953"/>
+        <p14:creationId xmlns:p14="http://schemas.microsoft.com/office/powerpoint/2010/main" val="2711980953"/>
       </p:ext>
     </p:extLst>
   </p:cSld>
@@ -26620,7 +26922,7 @@
     </p:spTree>
     <p:extLst>
       <p:ext uri="{BB962C8B-B14F-4D97-AF65-F5344CB8AC3E}">
-        <p14:creationId xmlns="" xmlns:p14="http://schemas.microsoft.com/office/powerpoint/2010/main" val="1131959525"/>
+        <p14:creationId xmlns:p14="http://schemas.microsoft.com/office/powerpoint/2010/main" val="1131959525"/>
       </p:ext>
     </p:extLst>
   </p:cSld>
@@ -26761,6 +27063,20 @@
               <a:tabLst/>
             </a:pPr>
             <a:r>
+              <a:rPr kumimoji="0" lang="ko-KR" altLang="en-US" sz="1050" b="0" i="0" u="none" strike="noStrike" cap="none" normalizeH="0" baseline="0" dirty="0" smtClean="0">
+                <a:ln>
+                  <a:noFill/>
+                </a:ln>
+                <a:solidFill>
+                  <a:schemeClr val="tx1"/>
+                </a:solidFill>
+                <a:effectLst/>
+                <a:latin typeface="맑은 고딕" pitchFamily="50" charset="-127"/>
+                <a:ea typeface="맑은 고딕" pitchFamily="50" charset="-127"/>
+              </a:rPr>
+              <a:t>등록된 과목과 </a:t>
+            </a:r>
+            <a:r>
               <a:rPr kumimoji="0" lang="en-US" altLang="ko-KR" sz="1050" b="0" i="0" u="none" strike="noStrike" cap="none" normalizeH="0" baseline="0" dirty="0" smtClean="0">
                 <a:ln>
                   <a:noFill/>
@@ -26772,7 +27088,7 @@
                 <a:latin typeface="맑은 고딕" pitchFamily="50" charset="-127"/>
                 <a:ea typeface="맑은 고딕" pitchFamily="50" charset="-127"/>
               </a:rPr>
-              <a:t> </a:t>
+              <a:t>To Do</a:t>
             </a:r>
             <a:r>
               <a:rPr kumimoji="0" lang="ko-KR" altLang="en-US" sz="1050" b="0" i="0" u="none" strike="noStrike" cap="none" normalizeH="0" baseline="0" dirty="0" smtClean="0">
@@ -26786,7 +27102,7 @@
                 <a:latin typeface="맑은 고딕" pitchFamily="50" charset="-127"/>
                 <a:ea typeface="맑은 고딕" pitchFamily="50" charset="-127"/>
               </a:rPr>
-              <a:t>사용자의 회원 가입을 처리하는 화면이다</a:t>
+              <a:t>를 확인하는 화면이다</a:t>
             </a:r>
             <a:r>
               <a:rPr kumimoji="0" lang="en-US" altLang="ko-KR" sz="1050" b="0" i="0" u="none" strike="noStrike" cap="none" normalizeH="0" baseline="0" dirty="0" smtClean="0">
@@ -26814,7 +27130,7 @@
         <p:grpSpPr>
           <a:xfrm>
             <a:off x="6061745" y="1732062"/>
-            <a:ext cx="2736194" cy="1582412"/>
+            <a:ext cx="2736190" cy="1582412"/>
             <a:chOff x="4614126" y="1746882"/>
             <a:chExt cx="4183813" cy="1582412"/>
           </a:xfrm>
@@ -26960,21 +27276,9 @@
             </a:bodyPr>
             <a:lstStyle/>
             <a:p>
-              <a:pPr marL="0" marR="0" indent="0" algn="just" defTabSz="914400" rtl="0" eaLnBrk="0" fontAlgn="base" latinLnBrk="0" hangingPunct="0">
-                <a:lnSpc>
-                  <a:spcPct val="100000"/>
-                </a:lnSpc>
-                <a:spcBef>
-                  <a:spcPct val="0"/>
-                </a:spcBef>
-                <a:spcAft>
-                  <a:spcPct val="0"/>
-                </a:spcAft>
-                <a:buClrTx/>
-                <a:buSzTx/>
+              <a:pPr algn="just">
                 <a:buFont typeface="Arial" pitchFamily="34" charset="0"/>
                 <a:buChar char="•"/>
-                <a:tabLst/>
               </a:pPr>
               <a:r>
                 <a:rPr kumimoji="0" lang="en-US" altLang="ko-KR" sz="1050" b="0" i="0" u="none" strike="noStrike" cap="none" normalizeH="0" baseline="0" dirty="0" smtClean="0">
@@ -26989,6 +27293,111 @@
                   <a:ea typeface="맑은 고딕" pitchFamily="50" charset="-127"/>
                 </a:rPr>
                 <a:t> </a:t>
+              </a:r>
+              <a:r>
+                <a:rPr kumimoji="0" lang="ko-KR" altLang="en-US" sz="1050" b="0" i="0" u="none" strike="noStrike" cap="none" normalizeH="0" baseline="0" dirty="0" smtClean="0">
+                  <a:ln>
+                    <a:noFill/>
+                  </a:ln>
+                  <a:solidFill>
+                    <a:schemeClr val="tx1"/>
+                  </a:solidFill>
+                  <a:effectLst/>
+                  <a:latin typeface="맑은 고딕" pitchFamily="50" charset="-127"/>
+                  <a:ea typeface="맑은 고딕" pitchFamily="50" charset="-127"/>
+                </a:rPr>
+                <a:t>과목관리 버튼을 누르면 과목을 등록</a:t>
+              </a:r>
+              <a:r>
+                <a:rPr kumimoji="0" lang="en-US" altLang="ko-KR" sz="1050" b="0" i="0" u="none" strike="noStrike" cap="none" normalizeH="0" baseline="0" dirty="0" smtClean="0">
+                  <a:ln>
+                    <a:noFill/>
+                  </a:ln>
+                  <a:solidFill>
+                    <a:schemeClr val="tx1"/>
+                  </a:solidFill>
+                  <a:effectLst/>
+                  <a:latin typeface="맑은 고딕" pitchFamily="50" charset="-127"/>
+                  <a:ea typeface="맑은 고딕" pitchFamily="50" charset="-127"/>
+                </a:rPr>
+                <a:t>/</a:t>
+              </a:r>
+              <a:r>
+                <a:rPr kumimoji="0" lang="ko-KR" altLang="en-US" sz="1050" b="0" i="0" u="none" strike="noStrike" cap="none" normalizeH="0" baseline="0" dirty="0" smtClean="0">
+                  <a:ln>
+                    <a:noFill/>
+                  </a:ln>
+                  <a:solidFill>
+                    <a:schemeClr val="tx1"/>
+                  </a:solidFill>
+                  <a:effectLst/>
+                  <a:latin typeface="맑은 고딕" pitchFamily="50" charset="-127"/>
+                  <a:ea typeface="맑은 고딕" pitchFamily="50" charset="-127"/>
+                </a:rPr>
+                <a:t>수정</a:t>
+              </a:r>
+              <a:endParaRPr kumimoji="0" lang="en-US" altLang="ko-KR" sz="1050" b="0" i="0" u="none" strike="noStrike" cap="none" normalizeH="0" baseline="0" dirty="0" smtClean="0">
+                <a:ln>
+                  <a:noFill/>
+                </a:ln>
+                <a:solidFill>
+                  <a:schemeClr val="tx1"/>
+                </a:solidFill>
+                <a:effectLst/>
+                <a:latin typeface="맑은 고딕" pitchFamily="50" charset="-127"/>
+                <a:ea typeface="맑은 고딕" pitchFamily="50" charset="-127"/>
+              </a:endParaRPr>
+            </a:p>
+            <a:p>
+              <a:pPr algn="just"/>
+              <a:r>
+                <a:rPr kumimoji="0" lang="ko-KR" altLang="en-US" sz="1050" b="0" i="0" u="none" strike="noStrike" cap="none" normalizeH="0" baseline="0" dirty="0" smtClean="0">
+                  <a:ln>
+                    <a:noFill/>
+                  </a:ln>
+                  <a:solidFill>
+                    <a:schemeClr val="tx1"/>
+                  </a:solidFill>
+                  <a:effectLst/>
+                  <a:latin typeface="맑은 고딕" pitchFamily="50" charset="-127"/>
+                  <a:ea typeface="맑은 고딕" pitchFamily="50" charset="-127"/>
+                </a:rPr>
+                <a:t>할 수 있는 과목관리 화면이 </a:t>
+              </a:r>
+              <a:r>
+                <a:rPr lang="ko-KR" altLang="en-US" sz="1050" dirty="0">
+                  <a:latin typeface="맑은 고딕" pitchFamily="50" charset="-127"/>
+                  <a:ea typeface="맑은 고딕" pitchFamily="50" charset="-127"/>
+                </a:rPr>
+                <a:t>열</a:t>
+              </a:r>
+              <a:r>
+                <a:rPr kumimoji="0" lang="ko-KR" altLang="en-US" sz="1050" b="0" i="0" u="none" strike="noStrike" cap="none" normalizeH="0" baseline="0" dirty="0" smtClean="0">
+                  <a:ln>
+                    <a:noFill/>
+                  </a:ln>
+                  <a:solidFill>
+                    <a:schemeClr val="tx1"/>
+                  </a:solidFill>
+                  <a:effectLst/>
+                  <a:latin typeface="맑은 고딕" pitchFamily="50" charset="-127"/>
+                  <a:ea typeface="맑은 고딕" pitchFamily="50" charset="-127"/>
+                </a:rPr>
+                <a:t>린다</a:t>
+              </a:r>
+              <a:r>
+                <a:rPr kumimoji="0" lang="en-US" altLang="ko-KR" sz="1050" b="0" i="0" u="none" strike="noStrike" cap="none" normalizeH="0" baseline="0" dirty="0" smtClean="0">
+                  <a:ln>
+                    <a:noFill/>
+                  </a:ln>
+                  <a:solidFill>
+                    <a:schemeClr val="tx1"/>
+                  </a:solidFill>
+                  <a:effectLst/>
+                  <a:latin typeface="맑은 고딕" pitchFamily="50" charset="-127"/>
+                  <a:ea typeface="맑은 고딕" pitchFamily="50" charset="-127"/>
+                </a:rPr>
+                <a:t>.</a:t>
               </a:r>
               <a:endParaRPr lang="en-US" altLang="ko-KR" sz="1050" dirty="0" smtClean="0">
                 <a:latin typeface="맑은 고딕" pitchFamily="50" charset="-127"/>
@@ -27026,6 +27435,68 @@
                 </a:rPr>
                 <a:t>.</a:t>
               </a:r>
+              <a:r>
+                <a:rPr kumimoji="0" lang="ko-KR" altLang="en-US" sz="1050" b="0" i="0" u="none" strike="noStrike" cap="none" normalizeH="0" baseline="0" dirty="0" smtClean="0">
+                  <a:ln>
+                    <a:noFill/>
+                  </a:ln>
+                  <a:solidFill>
+                    <a:schemeClr val="tx1"/>
+                  </a:solidFill>
+                  <a:effectLst/>
+                  <a:latin typeface="맑은 고딕" pitchFamily="50" charset="-127"/>
+                  <a:ea typeface="맑은 고딕" pitchFamily="50" charset="-127"/>
+                </a:rPr>
+                <a:t>삭제할 과목을 선택하고 삭제 버튼을 </a:t>
+              </a:r>
+              <a:endParaRPr lang="en-US" altLang="ko-KR" sz="1050" dirty="0" smtClean="0">
+                <a:latin typeface="맑은 고딕" pitchFamily="50" charset="-127"/>
+                <a:ea typeface="맑은 고딕" pitchFamily="50" charset="-127"/>
+              </a:endParaRPr>
+            </a:p>
+            <a:p>
+              <a:pPr marL="0" marR="0" indent="0" algn="just" defTabSz="914400" rtl="0" eaLnBrk="0" fontAlgn="base" latinLnBrk="0" hangingPunct="0">
+                <a:lnSpc>
+                  <a:spcPct val="100000"/>
+                </a:lnSpc>
+                <a:spcBef>
+                  <a:spcPct val="0"/>
+                </a:spcBef>
+                <a:spcAft>
+                  <a:spcPct val="0"/>
+                </a:spcAft>
+                <a:buClrTx/>
+                <a:buSzTx/>
+                <a:tabLst/>
+              </a:pPr>
+              <a:r>
+                <a:rPr kumimoji="0" lang="ko-KR" altLang="en-US" sz="1050" b="0" i="0" u="none" strike="noStrike" cap="none" normalizeH="0" baseline="0" dirty="0" smtClean="0">
+                  <a:ln>
+                    <a:noFill/>
+                  </a:ln>
+                  <a:solidFill>
+                    <a:schemeClr val="tx1"/>
+                  </a:solidFill>
+                  <a:effectLst/>
+                  <a:latin typeface="맑은 고딕" pitchFamily="50" charset="-127"/>
+                  <a:ea typeface="맑은 고딕" pitchFamily="50" charset="-127"/>
+                </a:rPr>
+                <a:t>누르면 해당 과목이 삭제된다</a:t>
+              </a:r>
+              <a:r>
+                <a:rPr kumimoji="0" lang="en-US" altLang="ko-KR" sz="1050" b="0" i="0" u="none" strike="noStrike" cap="none" normalizeH="0" baseline="0" dirty="0" smtClean="0">
+                  <a:ln>
+                    <a:noFill/>
+                  </a:ln>
+                  <a:solidFill>
+                    <a:schemeClr val="tx1"/>
+                  </a:solidFill>
+                  <a:effectLst/>
+                  <a:latin typeface="맑은 고딕" pitchFamily="50" charset="-127"/>
+                  <a:ea typeface="맑은 고딕" pitchFamily="50" charset="-127"/>
+                </a:rPr>
+                <a:t>.</a:t>
+              </a:r>
             </a:p>
             <a:p>
               <a:pPr marL="0" marR="0" indent="0" algn="just" defTabSz="914400" rtl="0" eaLnBrk="0" fontAlgn="base" latinLnBrk="0" hangingPunct="0">
@@ -27044,10 +27515,75 @@
                 <a:buChar char="•"/>
                 <a:tabLst/>
               </a:pPr>
+              <a:r>
+                <a:rPr lang="ko-KR" altLang="en-US" sz="1050" dirty="0" smtClean="0">
+                  <a:latin typeface="맑은 고딕" pitchFamily="50" charset="-127"/>
+                  <a:ea typeface="맑은 고딕" pitchFamily="50" charset="-127"/>
+                </a:rPr>
+                <a:t>총</a:t>
+              </a:r>
+              <a:r>
+                <a:rPr lang="en-US" altLang="ko-KR" sz="1050" dirty="0" err="1" smtClean="0">
+                  <a:latin typeface="맑은 고딕" pitchFamily="50" charset="-127"/>
+                  <a:ea typeface="맑은 고딕" pitchFamily="50" charset="-127"/>
+                </a:rPr>
+                <a:t>ToDo</a:t>
+              </a:r>
+              <a:r>
+                <a:rPr lang="ko-KR" altLang="en-US" sz="1050" dirty="0" smtClean="0">
+                  <a:latin typeface="맑은 고딕" pitchFamily="50" charset="-127"/>
+                  <a:ea typeface="맑은 고딕" pitchFamily="50" charset="-127"/>
+                </a:rPr>
+                <a:t>관리 버튼을 누르면 총 </a:t>
+              </a:r>
+              <a:r>
+                <a:rPr lang="en-US" altLang="ko-KR" sz="1050" dirty="0" err="1" smtClean="0">
+                  <a:latin typeface="맑은 고딕" pitchFamily="50" charset="-127"/>
+                  <a:ea typeface="맑은 고딕" pitchFamily="50" charset="-127"/>
+                </a:rPr>
+                <a:t>ToDo</a:t>
+              </a:r>
+              <a:r>
+                <a:rPr lang="ko-KR" altLang="en-US" sz="1050" dirty="0" smtClean="0">
+                  <a:latin typeface="맑은 고딕" pitchFamily="50" charset="-127"/>
+                  <a:ea typeface="맑은 고딕" pitchFamily="50" charset="-127"/>
+                </a:rPr>
+                <a:t>관리</a:t>
+              </a:r>
               <a:endParaRPr lang="en-US" altLang="ko-KR" sz="1050" dirty="0" smtClean="0">
                 <a:latin typeface="맑은 고딕" pitchFamily="50" charset="-127"/>
                 <a:ea typeface="맑은 고딕" pitchFamily="50" charset="-127"/>
               </a:endParaRPr>
+            </a:p>
+            <a:p>
+              <a:pPr marL="0" marR="0" indent="0" algn="dist" defTabSz="914400" rtl="0" eaLnBrk="0" fontAlgn="base" latinLnBrk="0" hangingPunct="0">
+                <a:lnSpc>
+                  <a:spcPct val="100000"/>
+                </a:lnSpc>
+                <a:spcBef>
+                  <a:spcPct val="0"/>
+                </a:spcBef>
+                <a:spcAft>
+                  <a:spcPct val="0"/>
+                </a:spcAft>
+                <a:buClrTx/>
+                <a:buSzTx/>
+                <a:tabLst/>
+              </a:pPr>
+              <a:r>
+                <a:rPr lang="ko-KR" altLang="en-US" sz="1050" dirty="0" smtClean="0">
+                  <a:latin typeface="맑은 고딕" pitchFamily="50" charset="-127"/>
+                  <a:ea typeface="맑은 고딕" pitchFamily="50" charset="-127"/>
+                </a:rPr>
+                <a:t>화면이 열린다</a:t>
+              </a:r>
+              <a:r>
+                <a:rPr lang="en-US" altLang="ko-KR" sz="1050" dirty="0" smtClean="0">
+                  <a:latin typeface="맑은 고딕" pitchFamily="50" charset="-127"/>
+                  <a:ea typeface="맑은 고딕" pitchFamily="50" charset="-127"/>
+                </a:rPr>
+                <a:t>.</a:t>
+              </a:r>
             </a:p>
           </p:txBody>
         </p:sp>
@@ -27197,11 +27733,60 @@
                 <a:buChar char="•"/>
               </a:pPr>
               <a:r>
-                <a:rPr lang="en-US" altLang="ko-KR" sz="1050" dirty="0">
+                <a:rPr lang="ko-KR" altLang="en-US" sz="1050" dirty="0" smtClean="0">
                   <a:latin typeface="맑은 고딕" pitchFamily="50" charset="-127"/>
                   <a:ea typeface="맑은 고딕" pitchFamily="50" charset="-127"/>
                 </a:rPr>
-                <a:t> </a:t>
+                <a:t>등록된 과목정보</a:t>
+              </a:r>
+              <a:r>
+                <a:rPr lang="en-US" altLang="ko-KR" sz="1050" dirty="0" smtClean="0">
+                  <a:latin typeface="맑은 고딕" pitchFamily="50" charset="-127"/>
+                  <a:ea typeface="맑은 고딕" pitchFamily="50" charset="-127"/>
+                </a:rPr>
+                <a:t>, </a:t>
+              </a:r>
+              <a:r>
+                <a:rPr lang="ko-KR" altLang="en-US" sz="1050" dirty="0" smtClean="0">
+                  <a:latin typeface="맑은 고딕" pitchFamily="50" charset="-127"/>
+                  <a:ea typeface="맑은 고딕" pitchFamily="50" charset="-127"/>
+                </a:rPr>
+                <a:t>설정된 알림</a:t>
+              </a:r>
+              <a:r>
+                <a:rPr lang="en-US" altLang="ko-KR" sz="1050" dirty="0" smtClean="0">
+                  <a:latin typeface="맑은 고딕" pitchFamily="50" charset="-127"/>
+                  <a:ea typeface="맑은 고딕" pitchFamily="50" charset="-127"/>
+                </a:rPr>
+                <a:t>, </a:t>
+              </a:r>
+              <a:r>
+                <a:rPr lang="ko-KR" altLang="en-US" sz="1050" dirty="0" smtClean="0">
+                  <a:latin typeface="맑은 고딕" pitchFamily="50" charset="-127"/>
+                  <a:ea typeface="맑은 고딕" pitchFamily="50" charset="-127"/>
+                </a:rPr>
+                <a:t>근접한 </a:t>
+              </a:r>
+              <a:endParaRPr lang="en-US" altLang="ko-KR" sz="1050" dirty="0" smtClean="0">
+                <a:latin typeface="맑은 고딕" pitchFamily="50" charset="-127"/>
+                <a:ea typeface="맑은 고딕" pitchFamily="50" charset="-127"/>
+              </a:endParaRPr>
+            </a:p>
+            <a:p>
+              <a:pPr algn="just"/>
+              <a:r>
+                <a:rPr lang="ko-KR" altLang="en-US" sz="1050" dirty="0" smtClean="0">
+                  <a:latin typeface="맑은 고딕" pitchFamily="50" charset="-127"/>
+                  <a:ea typeface="맑은 고딕" pitchFamily="50" charset="-127"/>
+                </a:rPr>
+                <a:t>알림을 화면에 출력한다</a:t>
+              </a:r>
+              <a:r>
+                <a:rPr lang="en-US" altLang="ko-KR" sz="1050" dirty="0" smtClean="0">
+                  <a:latin typeface="맑은 고딕" pitchFamily="50" charset="-127"/>
+                  <a:ea typeface="맑은 고딕" pitchFamily="50" charset="-127"/>
+                </a:rPr>
+                <a:t>.</a:t>
               </a:r>
             </a:p>
             <a:p>
@@ -27210,11 +27795,277 @@
                 <a:buChar char="•"/>
               </a:pPr>
               <a:r>
-                <a:rPr lang="en-US" altLang="ko-KR" sz="1050" dirty="0">
+                <a:rPr lang="ko-KR" altLang="en-US" sz="1050" dirty="0" smtClean="0">
                   <a:latin typeface="맑은 고딕" pitchFamily="50" charset="-127"/>
                   <a:ea typeface="맑은 고딕" pitchFamily="50" charset="-127"/>
                 </a:rPr>
-                <a:t> </a:t>
+                <a:t>삭제 버튼을 누르기 전에 과목을 클릭해야 </a:t>
+              </a:r>
+              <a:endParaRPr lang="en-US" altLang="ko-KR" sz="1050" dirty="0" smtClean="0">
+                <a:latin typeface="맑은 고딕" pitchFamily="50" charset="-127"/>
+                <a:ea typeface="맑은 고딕" pitchFamily="50" charset="-127"/>
+              </a:endParaRPr>
+            </a:p>
+            <a:p>
+              <a:pPr algn="just"/>
+              <a:r>
+                <a:rPr lang="ko-KR" altLang="en-US" sz="1050" dirty="0" smtClean="0">
+                  <a:latin typeface="맑은 고딕" pitchFamily="50" charset="-127"/>
+                  <a:ea typeface="맑은 고딕" pitchFamily="50" charset="-127"/>
+                </a:rPr>
+                <a:t>한다</a:t>
+              </a:r>
+              <a:r>
+                <a:rPr lang="en-US" altLang="ko-KR" sz="1050" dirty="0" smtClean="0">
+                  <a:latin typeface="맑은 고딕" pitchFamily="50" charset="-127"/>
+                  <a:ea typeface="맑은 고딕" pitchFamily="50" charset="-127"/>
+                </a:rPr>
+                <a:t>.</a:t>
+              </a:r>
+            </a:p>
+            <a:p>
+              <a:pPr algn="just">
+                <a:buFont typeface="Arial" pitchFamily="34" charset="0"/>
+                <a:buChar char="•"/>
+              </a:pPr>
+              <a:r>
+                <a:rPr lang="ko-KR" altLang="en-US" sz="1050" dirty="0" smtClean="0">
+                  <a:latin typeface="맑은 고딕" pitchFamily="50" charset="-127"/>
+                  <a:ea typeface="맑은 고딕" pitchFamily="50" charset="-127"/>
+                </a:rPr>
+                <a:t>설정된 알림은 클릭된 과목의 알림을 </a:t>
+              </a:r>
+              <a:endParaRPr lang="en-US" altLang="ko-KR" sz="1050" dirty="0" smtClean="0">
+                <a:latin typeface="맑은 고딕" pitchFamily="50" charset="-127"/>
+                <a:ea typeface="맑은 고딕" pitchFamily="50" charset="-127"/>
+              </a:endParaRPr>
+            </a:p>
+            <a:p>
+              <a:pPr algn="just"/>
+              <a:r>
+                <a:rPr lang="ko-KR" altLang="en-US" sz="1050" dirty="0" smtClean="0">
+                  <a:latin typeface="맑은 고딕" pitchFamily="50" charset="-127"/>
+                  <a:ea typeface="맑은 고딕" pitchFamily="50" charset="-127"/>
+                </a:rPr>
+                <a:t>출력한다</a:t>
+              </a:r>
+              <a:r>
+                <a:rPr lang="en-US" altLang="ko-KR" sz="1050" dirty="0" smtClean="0">
+                  <a:latin typeface="맑은 고딕" pitchFamily="50" charset="-127"/>
+                  <a:ea typeface="맑은 고딕" pitchFamily="50" charset="-127"/>
+                </a:rPr>
+                <a:t>.</a:t>
+              </a:r>
+              <a:endParaRPr lang="en-US" altLang="ko-KR" sz="1050" dirty="0">
+                <a:latin typeface="맑은 고딕" pitchFamily="50" charset="-127"/>
+                <a:ea typeface="맑은 고딕" pitchFamily="50" charset="-127"/>
+              </a:endParaRPr>
+            </a:p>
+            <a:p>
+              <a:pPr algn="just">
+                <a:buFont typeface="Arial" pitchFamily="34" charset="0"/>
+                <a:buChar char="•"/>
+              </a:pPr>
+              <a:r>
+                <a:rPr lang="ko-KR" altLang="en-US" sz="1050" dirty="0" smtClean="0">
+                  <a:latin typeface="맑은 고딕" pitchFamily="50" charset="-127"/>
+                  <a:ea typeface="맑은 고딕" pitchFamily="50" charset="-127"/>
+                </a:rPr>
+                <a:t>근접한 알림은 마감기한에 가장 가까운 </a:t>
+              </a:r>
+              <a:endParaRPr lang="en-US" altLang="ko-KR" sz="1050" dirty="0" smtClean="0">
+                <a:latin typeface="맑은 고딕" pitchFamily="50" charset="-127"/>
+                <a:ea typeface="맑은 고딕" pitchFamily="50" charset="-127"/>
+              </a:endParaRPr>
+            </a:p>
+            <a:p>
+              <a:pPr algn="just"/>
+              <a:r>
+                <a:rPr lang="en-US" altLang="ko-KR" sz="1050" dirty="0" smtClean="0">
+                  <a:latin typeface="맑은 고딕" pitchFamily="50" charset="-127"/>
+                  <a:ea typeface="맑은 고딕" pitchFamily="50" charset="-127"/>
+                </a:rPr>
+                <a:t>3</a:t>
+              </a:r>
+              <a:r>
+                <a:rPr lang="ko-KR" altLang="en-US" sz="1050" dirty="0" smtClean="0">
+                  <a:latin typeface="맑은 고딕" pitchFamily="50" charset="-127"/>
+                  <a:ea typeface="맑은 고딕" pitchFamily="50" charset="-127"/>
+                </a:rPr>
+                <a:t>개의 알림을 출력한다</a:t>
+              </a:r>
+              <a:r>
+                <a:rPr lang="en-US" altLang="ko-KR" sz="1050" dirty="0" smtClean="0">
+                  <a:latin typeface="맑은 고딕" pitchFamily="50" charset="-127"/>
+                  <a:ea typeface="맑은 고딕" pitchFamily="50" charset="-127"/>
+                </a:rPr>
+                <a:t>.</a:t>
+              </a:r>
+            </a:p>
+            <a:p>
+              <a:pPr algn="just">
+                <a:buFont typeface="Arial" pitchFamily="34" charset="0"/>
+                <a:buChar char="•"/>
+              </a:pPr>
+              <a:r>
+                <a:rPr lang="ko-KR" altLang="en-US" sz="1050" dirty="0" smtClean="0">
+                  <a:latin typeface="맑은 고딕" pitchFamily="50" charset="-127"/>
+                  <a:ea typeface="맑은 고딕" pitchFamily="50" charset="-127"/>
+                </a:rPr>
+                <a:t>과목관리</a:t>
+              </a:r>
+              <a:r>
+                <a:rPr lang="en-US" altLang="ko-KR" sz="1050" dirty="0" smtClean="0">
+                  <a:latin typeface="맑은 고딕" pitchFamily="50" charset="-127"/>
+                  <a:ea typeface="맑은 고딕" pitchFamily="50" charset="-127"/>
+                </a:rPr>
+                <a:t>, </a:t>
+              </a:r>
+              <a:r>
+                <a:rPr lang="ko-KR" altLang="en-US" sz="1050" dirty="0" smtClean="0">
+                  <a:latin typeface="맑은 고딕" pitchFamily="50" charset="-127"/>
+                  <a:ea typeface="맑은 고딕" pitchFamily="50" charset="-127"/>
+                </a:rPr>
+                <a:t>삭제 총</a:t>
+              </a:r>
+              <a:r>
+                <a:rPr lang="en-US" altLang="ko-KR" sz="1050" dirty="0" err="1" smtClean="0">
+                  <a:latin typeface="맑은 고딕" pitchFamily="50" charset="-127"/>
+                  <a:ea typeface="맑은 고딕" pitchFamily="50" charset="-127"/>
+                </a:rPr>
+                <a:t>Todo</a:t>
+              </a:r>
+              <a:r>
+                <a:rPr lang="ko-KR" altLang="en-US" sz="1050" dirty="0" smtClean="0">
+                  <a:latin typeface="맑은 고딕" pitchFamily="50" charset="-127"/>
+                  <a:ea typeface="맑은 고딕" pitchFamily="50" charset="-127"/>
+                </a:rPr>
+                <a:t>관리는 버튼으로 </a:t>
+              </a:r>
+              <a:endParaRPr lang="en-US" altLang="ko-KR" sz="1050" dirty="0" smtClean="0">
+                <a:latin typeface="맑은 고딕" pitchFamily="50" charset="-127"/>
+                <a:ea typeface="맑은 고딕" pitchFamily="50" charset="-127"/>
+              </a:endParaRPr>
+            </a:p>
+            <a:p>
+              <a:pPr algn="just"/>
+              <a:r>
+                <a:rPr lang="ko-KR" altLang="en-US" sz="1050" dirty="0" smtClean="0">
+                  <a:latin typeface="맑은 고딕" pitchFamily="50" charset="-127"/>
+                  <a:ea typeface="맑은 고딕" pitchFamily="50" charset="-127"/>
+                </a:rPr>
+                <a:t>한다</a:t>
+              </a:r>
+              <a:r>
+                <a:rPr lang="en-US" altLang="ko-KR" sz="1050" dirty="0" smtClean="0">
+                  <a:latin typeface="맑은 고딕" pitchFamily="50" charset="-127"/>
+                  <a:ea typeface="맑은 고딕" pitchFamily="50" charset="-127"/>
+                </a:rPr>
+                <a:t>.</a:t>
+              </a:r>
+            </a:p>
+            <a:p>
+              <a:pPr algn="just">
+                <a:buFont typeface="Arial" pitchFamily="34" charset="0"/>
+                <a:buChar char="•"/>
+              </a:pPr>
+              <a:r>
+                <a:rPr lang="ko-KR" altLang="en-US" sz="1050" dirty="0" smtClean="0">
+                  <a:latin typeface="맑은 고딕" pitchFamily="50" charset="-127"/>
+                  <a:ea typeface="맑은 고딕" pitchFamily="50" charset="-127"/>
+                </a:rPr>
+                <a:t>현재시간을 년</a:t>
+              </a:r>
+              <a:r>
+                <a:rPr lang="en-US" altLang="ko-KR" sz="1050" dirty="0" smtClean="0">
+                  <a:latin typeface="맑은 고딕" pitchFamily="50" charset="-127"/>
+                  <a:ea typeface="맑은 고딕" pitchFamily="50" charset="-127"/>
+                </a:rPr>
+                <a:t>-</a:t>
+              </a:r>
+              <a:r>
+                <a:rPr lang="ko-KR" altLang="en-US" sz="1050" dirty="0" smtClean="0">
+                  <a:latin typeface="맑은 고딕" pitchFamily="50" charset="-127"/>
+                  <a:ea typeface="맑은 고딕" pitchFamily="50" charset="-127"/>
+                </a:rPr>
+                <a:t>월</a:t>
+              </a:r>
+              <a:r>
+                <a:rPr lang="en-US" altLang="ko-KR" sz="1050" dirty="0" smtClean="0">
+                  <a:latin typeface="맑은 고딕" pitchFamily="50" charset="-127"/>
+                  <a:ea typeface="맑은 고딕" pitchFamily="50" charset="-127"/>
+                </a:rPr>
+                <a:t>-</a:t>
+              </a:r>
+              <a:r>
+                <a:rPr lang="ko-KR" altLang="en-US" sz="1050" dirty="0" smtClean="0">
+                  <a:latin typeface="맑은 고딕" pitchFamily="50" charset="-127"/>
+                  <a:ea typeface="맑은 고딕" pitchFamily="50" charset="-127"/>
+                </a:rPr>
+                <a:t>일</a:t>
+              </a:r>
+              <a:r>
+                <a:rPr lang="en-US" altLang="ko-KR" sz="1050" dirty="0" smtClean="0">
+                  <a:latin typeface="맑은 고딕" pitchFamily="50" charset="-127"/>
+                  <a:ea typeface="맑은 고딕" pitchFamily="50" charset="-127"/>
+                </a:rPr>
+                <a:t>-</a:t>
+              </a:r>
+              <a:r>
+                <a:rPr lang="ko-KR" altLang="en-US" sz="1050" dirty="0" smtClean="0">
+                  <a:latin typeface="맑은 고딕" pitchFamily="50" charset="-127"/>
+                  <a:ea typeface="맑은 고딕" pitchFamily="50" charset="-127"/>
+                </a:rPr>
+                <a:t>시</a:t>
+              </a:r>
+              <a:r>
+                <a:rPr lang="en-US" altLang="ko-KR" sz="1050" dirty="0" smtClean="0">
+                  <a:latin typeface="맑은 고딕" pitchFamily="50" charset="-127"/>
+                  <a:ea typeface="맑은 고딕" pitchFamily="50" charset="-127"/>
+                </a:rPr>
+                <a:t>-</a:t>
+              </a:r>
+              <a:r>
+                <a:rPr lang="ko-KR" altLang="en-US" sz="1050" dirty="0" smtClean="0">
+                  <a:latin typeface="맑은 고딕" pitchFamily="50" charset="-127"/>
+                  <a:ea typeface="맑은 고딕" pitchFamily="50" charset="-127"/>
+                </a:rPr>
+                <a:t>분</a:t>
+              </a:r>
+              <a:r>
+                <a:rPr lang="en-US" altLang="ko-KR" sz="1050" dirty="0" smtClean="0">
+                  <a:latin typeface="맑은 고딕" pitchFamily="50" charset="-127"/>
+                  <a:ea typeface="맑은 고딕" pitchFamily="50" charset="-127"/>
+                </a:rPr>
+                <a:t>-</a:t>
+              </a:r>
+              <a:r>
+                <a:rPr lang="ko-KR" altLang="en-US" sz="1050" dirty="0" smtClean="0">
+                  <a:latin typeface="맑은 고딕" pitchFamily="50" charset="-127"/>
+                  <a:ea typeface="맑은 고딕" pitchFamily="50" charset="-127"/>
+                </a:rPr>
+                <a:t>초 순으로 </a:t>
+              </a:r>
+              <a:endParaRPr lang="en-US" altLang="ko-KR" sz="1050" dirty="0" smtClean="0">
+                <a:latin typeface="맑은 고딕" pitchFamily="50" charset="-127"/>
+                <a:ea typeface="맑은 고딕" pitchFamily="50" charset="-127"/>
+              </a:endParaRPr>
+            </a:p>
+            <a:p>
+              <a:pPr algn="just"/>
+              <a:r>
+                <a:rPr lang="ko-KR" altLang="en-US" sz="1050" dirty="0" smtClean="0">
+                  <a:latin typeface="맑은 고딕" pitchFamily="50" charset="-127"/>
+                  <a:ea typeface="맑은 고딕" pitchFamily="50" charset="-127"/>
+                </a:rPr>
+                <a:t>알려준다</a:t>
+              </a:r>
+              <a:r>
+                <a:rPr lang="en-US" altLang="ko-KR" sz="1050" dirty="0" smtClean="0">
+                  <a:latin typeface="맑은 고딕" pitchFamily="50" charset="-127"/>
+                  <a:ea typeface="맑은 고딕" pitchFamily="50" charset="-127"/>
+                </a:rPr>
+                <a:t>.</a:t>
               </a:r>
               <a:endParaRPr lang="ko-KR" altLang="en-US" sz="1050" dirty="0">
                 <a:latin typeface="맑은 고딕" pitchFamily="50" charset="-127"/>
@@ -27233,7 +28084,7 @@
           <p:nvPr>
             <p:extLst>
               <p:ext uri="{D42A27DB-BD31-4B8C-83A1-F6EECF244321}">
-                <p14:modId xmlns="" xmlns:p14="http://schemas.microsoft.com/office/powerpoint/2010/main" val="91936271"/>
+                <p14:modId xmlns:p14="http://schemas.microsoft.com/office/powerpoint/2010/main" val="730022498"/>
               </p:ext>
             </p:extLst>
           </p:nvPr>
@@ -28339,7 +29190,7 @@
                           <a:latin typeface="맑은 고딕" pitchFamily="50" charset="-127"/>
                           <a:ea typeface="맑은 고딕" pitchFamily="50" charset="-127"/>
                         </a:rPr>
-                        <a:t>20170520_01</a:t>
+                        <a:t>20170521_01</a:t>
                       </a:r>
                       <a:endParaRPr kumimoji="1" lang="ko-KR" altLang="ko-KR" sz="900" b="0" i="0" u="none" strike="noStrike" cap="none" normalizeH="0" baseline="0" dirty="0" smtClean="0">
                         <a:ln>
@@ -28988,7 +29839,7 @@
     </p:spTree>
     <p:extLst>
       <p:ext uri="{BB962C8B-B14F-4D97-AF65-F5344CB8AC3E}">
-        <p14:creationId xmlns="" xmlns:p14="http://schemas.microsoft.com/office/powerpoint/2010/main" val="4072035316"/>
+        <p14:creationId xmlns:p14="http://schemas.microsoft.com/office/powerpoint/2010/main" val="4072035316"/>
       </p:ext>
     </p:extLst>
   </p:cSld>
@@ -29403,7 +30254,7 @@
           <p:nvPr>
             <p:extLst>
               <p:ext uri="{D42A27DB-BD31-4B8C-83A1-F6EECF244321}">
-                <p14:modId xmlns="" xmlns:p14="http://schemas.microsoft.com/office/powerpoint/2010/main" val="91936271"/>
+                <p14:modId xmlns:p14="http://schemas.microsoft.com/office/powerpoint/2010/main" val="1751135689"/>
               </p:ext>
             </p:extLst>
           </p:nvPr>
@@ -30509,7 +31360,7 @@
                           <a:latin typeface="맑은 고딕" pitchFamily="50" charset="-127"/>
                           <a:ea typeface="맑은 고딕" pitchFamily="50" charset="-127"/>
                         </a:rPr>
-                        <a:t>20170520_01</a:t>
+                        <a:t>20170521_01</a:t>
                       </a:r>
                       <a:endParaRPr kumimoji="1" lang="ko-KR" altLang="ko-KR" sz="1000" b="0" i="0" u="none" strike="noStrike" cap="none" normalizeH="0" baseline="0" dirty="0" smtClean="0">
                         <a:ln>
@@ -31101,14 +31952,14 @@
           <p:nvPr>
             <p:extLst>
               <p:ext uri="{D42A27DB-BD31-4B8C-83A1-F6EECF244321}">
-                <p14:modId xmlns="" xmlns:p14="http://schemas.microsoft.com/office/powerpoint/2010/main" val="1127966868"/>
+                <p14:modId xmlns:p14="http://schemas.microsoft.com/office/powerpoint/2010/main" val="928135181"/>
               </p:ext>
             </p:extLst>
           </p:nvPr>
         </p:nvGraphicFramePr>
         <p:xfrm>
           <a:off x="6061744" y="1203158"/>
-          <a:ext cx="2798764" cy="2265514"/>
+          <a:ext cx="2798764" cy="2696101"/>
         </p:xfrm>
         <a:graphic>
           <a:graphicData uri="http://schemas.openxmlformats.org/drawingml/2006/table">
@@ -31409,125 +32260,6 @@
                           <a:ea typeface="맑은 고딕" pitchFamily="50" charset="-127"/>
                         </a:rPr>
                         <a:t>1</a:t>
-                      </a:r>
-                      <a:endParaRPr lang="ko-KR" altLang="en-US" sz="1050" b="0" dirty="0">
-                        <a:solidFill>
-                          <a:schemeClr val="tx1"/>
-                        </a:solidFill>
-                        <a:latin typeface="맑은 고딕" pitchFamily="50" charset="-127"/>
-                        <a:ea typeface="맑은 고딕" pitchFamily="50" charset="-127"/>
-                      </a:endParaRPr>
-                    </a:p>
-                  </a:txBody>
-                  <a:tcPr anchor="ctr">
-                    <a:solidFill>
-                      <a:schemeClr val="bg1"/>
-                    </a:solidFill>
-                  </a:tcPr>
-                </a:tc>
-                <a:tc>
-                  <a:txBody>
-                    <a:bodyPr/>
-                    <a:lstStyle/>
-                    <a:p>
-                      <a:pPr algn="ctr" latinLnBrk="1"/>
-                      <a:r>
-                        <a:rPr lang="en-US" altLang="ko-KR" sz="1050" b="0" dirty="0" smtClean="0">
-                          <a:solidFill>
-                            <a:schemeClr val="tx1"/>
-                          </a:solidFill>
-                          <a:latin typeface="맑은 고딕" pitchFamily="50" charset="-127"/>
-                          <a:ea typeface="맑은 고딕" pitchFamily="50" charset="-127"/>
-                        </a:rPr>
-                        <a:t>I/O</a:t>
-                      </a:r>
-                      <a:endParaRPr lang="ko-KR" altLang="en-US" sz="1050" b="0" dirty="0">
-                        <a:solidFill>
-                          <a:schemeClr val="tx1"/>
-                        </a:solidFill>
-                        <a:latin typeface="맑은 고딕" pitchFamily="50" charset="-127"/>
-                        <a:ea typeface="맑은 고딕" pitchFamily="50" charset="-127"/>
-                      </a:endParaRPr>
-                    </a:p>
-                  </a:txBody>
-                  <a:tcPr anchor="ctr">
-                    <a:solidFill>
-                      <a:schemeClr val="bg1"/>
-                    </a:solidFill>
-                  </a:tcPr>
-                </a:tc>
-                <a:tc>
-                  <a:txBody>
-                    <a:bodyPr/>
-                    <a:lstStyle/>
-                    <a:p>
-                      <a:pPr latinLnBrk="1"/>
-                      <a:r>
-                        <a:rPr lang="ko-KR" altLang="en-US" sz="1050" b="0" dirty="0" smtClean="0">
-                          <a:solidFill>
-                            <a:schemeClr val="tx1"/>
-                          </a:solidFill>
-                          <a:latin typeface="맑은 고딕" pitchFamily="50" charset="-127"/>
-                          <a:ea typeface="맑은 고딕" pitchFamily="50" charset="-127"/>
-                        </a:rPr>
-                        <a:t>아이디 입력</a:t>
-                      </a:r>
-                      <a:endParaRPr lang="ko-KR" altLang="en-US" sz="1050" b="0" dirty="0">
-                        <a:solidFill>
-                          <a:schemeClr val="tx1"/>
-                        </a:solidFill>
-                        <a:latin typeface="맑은 고딕" pitchFamily="50" charset="-127"/>
-                        <a:ea typeface="맑은 고딕" pitchFamily="50" charset="-127"/>
-                      </a:endParaRPr>
-                    </a:p>
-                  </a:txBody>
-                  <a:tcPr anchor="ctr">
-                    <a:solidFill>
-                      <a:schemeClr val="bg1"/>
-                    </a:solidFill>
-                  </a:tcPr>
-                </a:tc>
-                <a:tc>
-                  <a:txBody>
-                    <a:bodyPr/>
-                    <a:lstStyle/>
-                    <a:p>
-                      <a:pPr latinLnBrk="1"/>
-                      <a:r>
-                        <a:rPr lang="en-US" altLang="ko-KR" sz="1050" b="0" baseline="0" dirty="0" smtClean="0">
-                          <a:solidFill>
-                            <a:schemeClr val="tx1"/>
-                          </a:solidFill>
-                          <a:latin typeface="맑은 고딕" pitchFamily="50" charset="-127"/>
-                          <a:ea typeface="맑은 고딕" pitchFamily="50" charset="-127"/>
-                        </a:rPr>
-                        <a:t>Text Box</a:t>
-                      </a:r>
-                    </a:p>
-                  </a:txBody>
-                  <a:tcPr anchor="ctr">
-                    <a:solidFill>
-                      <a:schemeClr val="bg1"/>
-                    </a:solidFill>
-                  </a:tcPr>
-                </a:tc>
-              </a:tr>
-              <a:tr h="430587">
-                <a:tc>
-                  <a:txBody>
-                    <a:bodyPr/>
-                    <a:lstStyle/>
-                    <a:p>
-                      <a:pPr algn="ctr" latinLnBrk="1"/>
-                      <a:r>
-                        <a:rPr lang="en-US" altLang="ko-KR" sz="1050" b="0" dirty="0" smtClean="0">
-                          <a:solidFill>
-                            <a:schemeClr val="tx1"/>
-                          </a:solidFill>
-                          <a:latin typeface="맑은 고딕" pitchFamily="50" charset="-127"/>
-                          <a:ea typeface="맑은 고딕" pitchFamily="50" charset="-127"/>
-                        </a:rPr>
-                        <a:t>2</a:t>
                       </a:r>
                       <a:endParaRPr lang="ko-KR" altLang="en-US" sz="1050" b="0" dirty="0">
                         <a:solidFill>
@@ -31574,7 +32306,7 @@
                           <a:latin typeface="맑은 고딕" pitchFamily="50" charset="-127"/>
                           <a:ea typeface="맑은 고딕" pitchFamily="50" charset="-127"/>
                         </a:rPr>
-                        <a:t>I/O</a:t>
+                        <a:t>I</a:t>
                       </a:r>
                       <a:endParaRPr lang="ko-KR" altLang="en-US" sz="1050" b="0" dirty="0" smtClean="0">
                         <a:solidFill>
@@ -31605,7 +32337,7 @@
                           <a:latin typeface="맑은 고딕" pitchFamily="50" charset="-127"/>
                           <a:ea typeface="맑은 고딕" pitchFamily="50" charset="-127"/>
                         </a:rPr>
-                        <a:t>비밀번호 입력</a:t>
+                        <a:t>과목 관리</a:t>
                       </a:r>
                       <a:endParaRPr lang="ko-KR" altLang="en-US" sz="1050" b="0" dirty="0">
                         <a:solidFill>
@@ -31627,7 +32359,56 @@
                     <a:bodyPr/>
                     <a:lstStyle/>
                     <a:p>
-                      <a:pPr latinLnBrk="1"/>
+                      <a:pPr marL="0" marR="0" lvl="0" indent="0" algn="l" defTabSz="914400" rtl="0" eaLnBrk="1" fontAlgn="auto" latinLnBrk="1" hangingPunct="1">
+                        <a:lnSpc>
+                          <a:spcPct val="100000"/>
+                        </a:lnSpc>
+                        <a:spcBef>
+                          <a:spcPts val="0"/>
+                        </a:spcBef>
+                        <a:spcAft>
+                          <a:spcPts val="0"/>
+                        </a:spcAft>
+                        <a:buClrTx/>
+                        <a:buSzTx/>
+                        <a:buFontTx/>
+                        <a:buNone/>
+                        <a:tabLst/>
+                        <a:defRPr/>
+                      </a:pPr>
+                      <a:r>
+                        <a:rPr lang="en-US" altLang="ko-KR" sz="1050" b="0" baseline="0" dirty="0" smtClean="0">
+                          <a:solidFill>
+                            <a:schemeClr val="tx1"/>
+                          </a:solidFill>
+                          <a:latin typeface="맑은 고딕" pitchFamily="50" charset="-127"/>
+                          <a:ea typeface="맑은 고딕" pitchFamily="50" charset="-127"/>
+                        </a:rPr>
+                        <a:t>Push Button</a:t>
+                      </a:r>
+                      <a:endParaRPr lang="ko-KR" altLang="en-US" sz="1050" b="0" dirty="0" smtClean="0">
+                        <a:solidFill>
+                          <a:schemeClr val="tx1"/>
+                        </a:solidFill>
+                        <a:latin typeface="맑은 고딕" pitchFamily="50" charset="-127"/>
+                        <a:ea typeface="맑은 고딕" pitchFamily="50" charset="-127"/>
+                      </a:endParaRPr>
+                    </a:p>
+                  </a:txBody>
+                  <a:tcPr anchor="ctr">
+                    <a:solidFill>
+                      <a:schemeClr val="bg1"/>
+                    </a:solidFill>
+                  </a:tcPr>
+                </a:tc>
+              </a:tr>
+              <a:tr h="430587">
+                <a:tc>
+                  <a:txBody>
+                    <a:bodyPr/>
+                    <a:lstStyle/>
+                    <a:p>
+                      <a:pPr algn="ctr" latinLnBrk="1"/>
                       <a:r>
                         <a:rPr lang="en-US" altLang="ko-KR" sz="1050" b="0" dirty="0" smtClean="0">
                           <a:solidFill>
@@ -31636,17 +32417,7 @@
                           <a:latin typeface="맑은 고딕" pitchFamily="50" charset="-127"/>
                           <a:ea typeface="맑은 고딕" pitchFamily="50" charset="-127"/>
                         </a:rPr>
-                        <a:t>Text</a:t>
-                      </a:r>
-                      <a:r>
-                        <a:rPr lang="en-US" altLang="ko-KR" sz="1050" b="0" baseline="0" dirty="0" smtClean="0">
-                          <a:solidFill>
-                            <a:schemeClr val="tx1"/>
-                          </a:solidFill>
-                          <a:latin typeface="맑은 고딕" pitchFamily="50" charset="-127"/>
-                          <a:ea typeface="맑은 고딕" pitchFamily="50" charset="-127"/>
-                        </a:rPr>
-                        <a:t> Box</a:t>
+                        <a:t>2</a:t>
                       </a:r>
                       <a:endParaRPr lang="ko-KR" altLang="en-US" sz="1050" b="0" dirty="0">
                         <a:solidFill>
@@ -31663,14 +32434,69 @@
                     </a:solidFill>
                   </a:tcPr>
                 </a:tc>
-              </a:tr>
-              <a:tr h="430587">
                 <a:tc>
                   <a:txBody>
                     <a:bodyPr/>
                     <a:lstStyle/>
                     <a:p>
-                      <a:pPr algn="ctr" latinLnBrk="1"/>
+                      <a:pPr marL="0" marR="0" indent="0" algn="ctr" defTabSz="914400" rtl="0" eaLnBrk="1" fontAlgn="auto" latinLnBrk="1" hangingPunct="1">
+                        <a:lnSpc>
+                          <a:spcPct val="100000"/>
+                        </a:lnSpc>
+                        <a:spcBef>
+                          <a:spcPts val="0"/>
+                        </a:spcBef>
+                        <a:spcAft>
+                          <a:spcPts val="0"/>
+                        </a:spcAft>
+                        <a:buClrTx/>
+                        <a:buSzTx/>
+                        <a:buFontTx/>
+                        <a:buNone/>
+                        <a:tabLst/>
+                        <a:defRPr/>
+                      </a:pPr>
+                      <a:r>
+                        <a:rPr lang="en-US" altLang="ko-KR" sz="1050" b="0" dirty="0" smtClean="0">
+                          <a:solidFill>
+                            <a:schemeClr val="tx1"/>
+                          </a:solidFill>
+                          <a:latin typeface="맑은 고딕" pitchFamily="50" charset="-127"/>
+                          <a:ea typeface="맑은 고딕" pitchFamily="50" charset="-127"/>
+                        </a:rPr>
+                        <a:t>I</a:t>
+                      </a:r>
+                      <a:endParaRPr lang="ko-KR" altLang="en-US" sz="1050" b="0" dirty="0" smtClean="0">
+                        <a:solidFill>
+                          <a:schemeClr val="tx1"/>
+                        </a:solidFill>
+                        <a:latin typeface="맑은 고딕" pitchFamily="50" charset="-127"/>
+                        <a:ea typeface="맑은 고딕" pitchFamily="50" charset="-127"/>
+                      </a:endParaRPr>
+                    </a:p>
+                  </a:txBody>
+                  <a:tcPr anchor="ctr">
+                    <a:solidFill>
+                      <a:schemeClr val="bg1"/>
+                    </a:solidFill>
+                  </a:tcPr>
+                </a:tc>
+                <a:tc>
+                  <a:txBody>
+                    <a:bodyPr/>
+                    <a:lstStyle/>
+                    <a:p>
+                      <a:pPr latinLnBrk="1"/>
+                      <a:r>
+                        <a:rPr lang="ko-KR" altLang="en-US" sz="1050" b="0" dirty="0" smtClean="0">
+                          <a:solidFill>
+                            <a:schemeClr val="tx1"/>
+                          </a:solidFill>
+                          <a:latin typeface="맑은 고딕" pitchFamily="50" charset="-127"/>
+                          <a:ea typeface="맑은 고딕" pitchFamily="50" charset="-127"/>
+                        </a:rPr>
+                        <a:t>과목 삭제</a:t>
+                      </a:r>
                       <a:endParaRPr lang="ko-KR" altLang="en-US" sz="1050" b="0" dirty="0">
                         <a:solidFill>
                           <a:schemeClr val="tx1"/>
@@ -31691,7 +32517,66 @@
                     <a:bodyPr/>
                     <a:lstStyle/>
                     <a:p>
+                      <a:pPr marL="0" marR="0" lvl="0" indent="0" algn="l" defTabSz="914400" rtl="0" eaLnBrk="1" fontAlgn="auto" latinLnBrk="1" hangingPunct="1">
+                        <a:lnSpc>
+                          <a:spcPct val="100000"/>
+                        </a:lnSpc>
+                        <a:spcBef>
+                          <a:spcPts val="0"/>
+                        </a:spcBef>
+                        <a:spcAft>
+                          <a:spcPts val="0"/>
+                        </a:spcAft>
+                        <a:buClrTx/>
+                        <a:buSzTx/>
+                        <a:buFontTx/>
+                        <a:buNone/>
+                        <a:tabLst/>
+                        <a:defRPr/>
+                      </a:pPr>
+                      <a:r>
+                        <a:rPr lang="en-US" altLang="ko-KR" sz="1050" b="0" baseline="0" dirty="0" smtClean="0">
+                          <a:solidFill>
+                            <a:schemeClr val="tx1"/>
+                          </a:solidFill>
+                          <a:latin typeface="맑은 고딕" pitchFamily="50" charset="-127"/>
+                          <a:ea typeface="맑은 고딕" pitchFamily="50" charset="-127"/>
+                        </a:rPr>
+                        <a:t>Push Button</a:t>
+                      </a:r>
+                      <a:endParaRPr lang="ko-KR" altLang="en-US" sz="1050" b="0" dirty="0" smtClean="0">
+                        <a:solidFill>
+                          <a:schemeClr val="tx1"/>
+                        </a:solidFill>
+                        <a:latin typeface="맑은 고딕" pitchFamily="50" charset="-127"/>
+                        <a:ea typeface="맑은 고딕" pitchFamily="50" charset="-127"/>
+                      </a:endParaRPr>
+                    </a:p>
+                  </a:txBody>
+                  <a:tcPr anchor="ctr">
+                    <a:solidFill>
+                      <a:schemeClr val="bg1"/>
+                    </a:solidFill>
+                  </a:tcPr>
+                </a:tc>
+              </a:tr>
+              <a:tr h="430587">
+                <a:tc>
+                  <a:txBody>
+                    <a:bodyPr/>
+                    <a:lstStyle/>
+                    <a:p>
                       <a:pPr algn="ctr" latinLnBrk="1"/>
+                      <a:r>
+                        <a:rPr lang="en-US" altLang="ko-KR" sz="1050" b="0" dirty="0" smtClean="0">
+                          <a:solidFill>
+                            <a:schemeClr val="tx1"/>
+                          </a:solidFill>
+                          <a:latin typeface="맑은 고딕" pitchFamily="50" charset="-127"/>
+                          <a:ea typeface="맑은 고딕" pitchFamily="50" charset="-127"/>
+                        </a:rPr>
+                        <a:t>3</a:t>
+                      </a:r>
                       <a:endParaRPr lang="ko-KR" altLang="en-US" sz="1050" b="0" dirty="0">
                         <a:solidFill>
                           <a:schemeClr val="tx1"/>
@@ -31712,8 +32597,65 @@
                     <a:bodyPr/>
                     <a:lstStyle/>
                     <a:p>
+                      <a:pPr marL="0" marR="0" indent="0" algn="ctr" defTabSz="914400" rtl="0" eaLnBrk="1" fontAlgn="auto" latinLnBrk="1" hangingPunct="1">
+                        <a:lnSpc>
+                          <a:spcPct val="100000"/>
+                        </a:lnSpc>
+                        <a:spcBef>
+                          <a:spcPts val="0"/>
+                        </a:spcBef>
+                        <a:spcAft>
+                          <a:spcPts val="0"/>
+                        </a:spcAft>
+                        <a:buClrTx/>
+                        <a:buSzTx/>
+                        <a:buFontTx/>
+                        <a:buNone/>
+                        <a:tabLst/>
+                        <a:defRPr/>
+                      </a:pPr>
+                      <a:r>
+                        <a:rPr lang="en-US" altLang="ko-KR" sz="1050" b="0" dirty="0" smtClean="0">
+                          <a:solidFill>
+                            <a:schemeClr val="tx1"/>
+                          </a:solidFill>
+                          <a:latin typeface="맑은 고딕" pitchFamily="50" charset="-127"/>
+                          <a:ea typeface="맑은 고딕" pitchFamily="50" charset="-127"/>
+                        </a:rPr>
+                        <a:t>I</a:t>
+                      </a:r>
+                      <a:endParaRPr lang="ko-KR" altLang="en-US" sz="1050" b="0" dirty="0" smtClean="0">
+                        <a:solidFill>
+                          <a:schemeClr val="tx1"/>
+                        </a:solidFill>
+                        <a:latin typeface="맑은 고딕" pitchFamily="50" charset="-127"/>
+                        <a:ea typeface="맑은 고딕" pitchFamily="50" charset="-127"/>
+                      </a:endParaRPr>
+                    </a:p>
+                  </a:txBody>
+                  <a:tcPr anchor="ctr">
+                    <a:solidFill>
+                      <a:schemeClr val="bg1"/>
+                    </a:solidFill>
+                  </a:tcPr>
+                </a:tc>
+                <a:tc>
+                  <a:txBody>
+                    <a:bodyPr/>
+                    <a:lstStyle/>
+                    <a:p>
                       <a:pPr latinLnBrk="1"/>
                       <a:r>
+                        <a:rPr lang="ko-KR" altLang="en-US" sz="1050" b="0" dirty="0" smtClean="0">
+                          <a:solidFill>
+                            <a:schemeClr val="tx1"/>
+                          </a:solidFill>
+                          <a:latin typeface="맑은 고딕" pitchFamily="50" charset="-127"/>
+                          <a:ea typeface="맑은 고딕" pitchFamily="50" charset="-127"/>
+                        </a:rPr>
+                        <a:t>총 </a:t>
+                      </a:r>
+                      <a:r>
                         <a:rPr lang="en-US" altLang="ko-KR" sz="1050" b="0" dirty="0" smtClean="0">
                           <a:solidFill>
                             <a:schemeClr val="tx1"/>
@@ -31721,7 +32663,17 @@
                           <a:latin typeface="맑은 고딕" pitchFamily="50" charset="-127"/>
                           <a:ea typeface="맑은 고딕" pitchFamily="50" charset="-127"/>
                         </a:rPr>
-                        <a:t>…</a:t>
+                        <a:t>To Do </a:t>
+                      </a:r>
+                      <a:r>
+                        <a:rPr lang="ko-KR" altLang="en-US" sz="1050" b="0" dirty="0" smtClean="0">
+                          <a:solidFill>
+                            <a:schemeClr val="tx1"/>
+                          </a:solidFill>
+                          <a:latin typeface="맑은 고딕" pitchFamily="50" charset="-127"/>
+                          <a:ea typeface="맑은 고딕" pitchFamily="50" charset="-127"/>
+                        </a:rPr>
+                        <a:t>관리</a:t>
                       </a:r>
                       <a:endParaRPr lang="ko-KR" altLang="en-US" sz="1050" b="0" dirty="0">
                         <a:solidFill>
@@ -31743,8 +32695,192 @@
                     <a:bodyPr/>
                     <a:lstStyle/>
                     <a:p>
+                      <a:pPr marL="0" marR="0" lvl="0" indent="0" algn="l" defTabSz="914400" rtl="0" eaLnBrk="1" fontAlgn="auto" latinLnBrk="1" hangingPunct="1">
+                        <a:lnSpc>
+                          <a:spcPct val="100000"/>
+                        </a:lnSpc>
+                        <a:spcBef>
+                          <a:spcPts val="0"/>
+                        </a:spcBef>
+                        <a:spcAft>
+                          <a:spcPts val="0"/>
+                        </a:spcAft>
+                        <a:buClrTx/>
+                        <a:buSzTx/>
+                        <a:buFontTx/>
+                        <a:buNone/>
+                        <a:tabLst/>
+                        <a:defRPr/>
+                      </a:pPr>
+                      <a:r>
+                        <a:rPr lang="en-US" altLang="ko-KR" sz="1050" b="0" baseline="0" dirty="0" smtClean="0">
+                          <a:solidFill>
+                            <a:schemeClr val="tx1"/>
+                          </a:solidFill>
+                          <a:latin typeface="맑은 고딕" pitchFamily="50" charset="-127"/>
+                          <a:ea typeface="맑은 고딕" pitchFamily="50" charset="-127"/>
+                        </a:rPr>
+                        <a:t>Push Button</a:t>
+                      </a:r>
+                      <a:endParaRPr lang="ko-KR" altLang="en-US" sz="1050" b="0" dirty="0" smtClean="0">
+                        <a:solidFill>
+                          <a:schemeClr val="tx1"/>
+                        </a:solidFill>
+                        <a:latin typeface="맑은 고딕" pitchFamily="50" charset="-127"/>
+                        <a:ea typeface="맑은 고딕" pitchFamily="50" charset="-127"/>
+                      </a:endParaRPr>
+                    </a:p>
+                  </a:txBody>
+                  <a:tcPr anchor="ctr">
+                    <a:solidFill>
+                      <a:schemeClr val="bg1"/>
+                    </a:solidFill>
+                  </a:tcPr>
+                </a:tc>
+              </a:tr>
+              <a:tr h="430587">
+                <a:tc>
+                  <a:txBody>
+                    <a:bodyPr/>
+                    <a:lstStyle/>
+                    <a:p>
+                      <a:pPr algn="ctr" latinLnBrk="1"/>
+                      <a:r>
+                        <a:rPr lang="en-US" altLang="ko-KR" sz="1050" b="0" dirty="0" smtClean="0">
+                          <a:solidFill>
+                            <a:schemeClr val="tx1"/>
+                          </a:solidFill>
+                          <a:latin typeface="맑은 고딕" pitchFamily="50" charset="-127"/>
+                          <a:ea typeface="맑은 고딕" pitchFamily="50" charset="-127"/>
+                        </a:rPr>
+                        <a:t>4</a:t>
+                      </a:r>
+                      <a:endParaRPr lang="ko-KR" altLang="en-US" sz="1050" b="0" dirty="0">
+                        <a:solidFill>
+                          <a:schemeClr val="tx1"/>
+                        </a:solidFill>
+                        <a:latin typeface="맑은 고딕" pitchFamily="50" charset="-127"/>
+                        <a:ea typeface="맑은 고딕" pitchFamily="50" charset="-127"/>
+                      </a:endParaRPr>
+                    </a:p>
+                  </a:txBody>
+                  <a:tcPr anchor="ctr">
+                    <a:solidFill>
+                      <a:schemeClr val="bg1"/>
+                    </a:solidFill>
+                  </a:tcPr>
+                </a:tc>
+                <a:tc>
+                  <a:txBody>
+                    <a:bodyPr/>
+                    <a:lstStyle/>
+                    <a:p>
+                      <a:pPr marL="0" marR="0" indent="0" algn="ctr" defTabSz="914400" rtl="0" eaLnBrk="1" fontAlgn="auto" latinLnBrk="1" hangingPunct="1">
+                        <a:lnSpc>
+                          <a:spcPct val="100000"/>
+                        </a:lnSpc>
+                        <a:spcBef>
+                          <a:spcPts val="0"/>
+                        </a:spcBef>
+                        <a:spcAft>
+                          <a:spcPts val="0"/>
+                        </a:spcAft>
+                        <a:buClrTx/>
+                        <a:buSzTx/>
+                        <a:buFontTx/>
+                        <a:buNone/>
+                        <a:tabLst/>
+                        <a:defRPr/>
+                      </a:pPr>
+                      <a:r>
+                        <a:rPr lang="en-US" altLang="ko-KR" sz="1050" b="0" dirty="0" smtClean="0">
+                          <a:solidFill>
+                            <a:schemeClr val="tx1"/>
+                          </a:solidFill>
+                          <a:latin typeface="맑은 고딕" pitchFamily="50" charset="-127"/>
+                          <a:ea typeface="맑은 고딕" pitchFamily="50" charset="-127"/>
+                        </a:rPr>
+                        <a:t>I/O</a:t>
+                      </a:r>
+                      <a:endParaRPr lang="ko-KR" altLang="en-US" sz="1050" b="0" dirty="0" smtClean="0">
+                        <a:solidFill>
+                          <a:schemeClr val="tx1"/>
+                        </a:solidFill>
+                        <a:latin typeface="맑은 고딕" pitchFamily="50" charset="-127"/>
+                        <a:ea typeface="맑은 고딕" pitchFamily="50" charset="-127"/>
+                      </a:endParaRPr>
+                    </a:p>
+                  </a:txBody>
+                  <a:tcPr anchor="ctr">
+                    <a:solidFill>
+                      <a:schemeClr val="bg1"/>
+                    </a:solidFill>
+                  </a:tcPr>
+                </a:tc>
+                <a:tc>
+                  <a:txBody>
+                    <a:bodyPr/>
+                    <a:lstStyle/>
+                    <a:p>
                       <a:pPr latinLnBrk="1"/>
+                      <a:r>
+                        <a:rPr lang="ko-KR" altLang="en-US" sz="1050" b="0" dirty="0" smtClean="0">
+                          <a:solidFill>
+                            <a:schemeClr val="tx1"/>
+                          </a:solidFill>
+                          <a:latin typeface="맑은 고딕" pitchFamily="50" charset="-127"/>
+                          <a:ea typeface="맑은 고딕" pitchFamily="50" charset="-127"/>
+                        </a:rPr>
+                        <a:t>삭제할 과목 클릭</a:t>
+                      </a:r>
                       <a:endParaRPr lang="ko-KR" altLang="en-US" sz="1050" b="0" dirty="0">
+                        <a:solidFill>
+                          <a:schemeClr val="tx1"/>
+                        </a:solidFill>
+                        <a:latin typeface="맑은 고딕" pitchFamily="50" charset="-127"/>
+                        <a:ea typeface="맑은 고딕" pitchFamily="50" charset="-127"/>
+                      </a:endParaRPr>
+                    </a:p>
+                  </a:txBody>
+                  <a:tcPr anchor="ctr">
+                    <a:solidFill>
+                      <a:schemeClr val="bg1"/>
+                    </a:solidFill>
+                  </a:tcPr>
+                </a:tc>
+                <a:tc>
+                  <a:txBody>
+                    <a:bodyPr/>
+                    <a:lstStyle/>
+                    <a:p>
+                      <a:pPr marL="0" marR="0" lvl="0" indent="0" algn="l" defTabSz="914400" rtl="0" eaLnBrk="1" fontAlgn="auto" latinLnBrk="1" hangingPunct="1">
+                        <a:lnSpc>
+                          <a:spcPct val="100000"/>
+                        </a:lnSpc>
+                        <a:spcBef>
+                          <a:spcPts val="0"/>
+                        </a:spcBef>
+                        <a:spcAft>
+                          <a:spcPts val="0"/>
+                        </a:spcAft>
+                        <a:buClrTx/>
+                        <a:buSzTx/>
+                        <a:buFontTx/>
+                        <a:buNone/>
+                        <a:tabLst/>
+                        <a:defRPr/>
+                      </a:pPr>
+                      <a:r>
+                        <a:rPr lang="en-US" altLang="ko-KR" sz="1050" b="0" baseline="0" dirty="0" smtClean="0">
+                          <a:solidFill>
+                            <a:schemeClr val="tx1"/>
+                          </a:solidFill>
+                          <a:latin typeface="맑은 고딕" pitchFamily="50" charset="-127"/>
+                          <a:ea typeface="맑은 고딕" pitchFamily="50" charset="-127"/>
+                        </a:rPr>
+                        <a:t>Push Button</a:t>
+                      </a:r>
+                      <a:endParaRPr lang="ko-KR" altLang="en-US" sz="1050" b="0" dirty="0" smtClean="0">
                         <a:solidFill>
                           <a:schemeClr val="tx1"/>
                         </a:solidFill>
@@ -31767,7 +32903,7 @@
     </p:spTree>
     <p:extLst>
       <p:ext uri="{BB962C8B-B14F-4D97-AF65-F5344CB8AC3E}">
-        <p14:creationId xmlns="" xmlns:p14="http://schemas.microsoft.com/office/powerpoint/2010/main" val="83292215"/>
+        <p14:creationId xmlns:p14="http://schemas.microsoft.com/office/powerpoint/2010/main" val="83292215"/>
       </p:ext>
     </p:extLst>
   </p:cSld>
@@ -32124,20 +33260,57 @@
                 <a:tabLst/>
               </a:pPr>
               <a:r>
-                <a:rPr kumimoji="0" lang="en-US" altLang="ko-KR" sz="1050" b="0" i="0" u="none" strike="noStrike" cap="none" normalizeH="0" baseline="0" dirty="0" smtClean="0">
-                  <a:ln>
-                    <a:noFill/>
-                  </a:ln>
-                  <a:solidFill>
-                    <a:schemeClr val="tx1"/>
-                  </a:solidFill>
-                  <a:effectLst/>
+                <a:rPr lang="ko-KR" altLang="en-US" sz="1050" dirty="0" smtClean="0">
+                  <a:latin typeface="맑은 고딕" pitchFamily="50" charset="-127"/>
+                  <a:ea typeface="맑은 고딕" pitchFamily="50" charset="-127"/>
+                </a:rPr>
+                <a:t>과목정보를 입력하고 등록 버튼을 누르면</a:t>
+              </a:r>
+              <a:r>
+                <a:rPr lang="en-US" altLang="ko-KR" sz="1050" dirty="0" smtClean="0">
                   <a:latin typeface="맑은 고딕" pitchFamily="50" charset="-127"/>
                   <a:ea typeface="맑은 고딕" pitchFamily="50" charset="-127"/>
                 </a:rPr>
                 <a:t> </a:t>
               </a:r>
-              <a:endParaRPr lang="en-US" altLang="ko-KR" sz="1050" dirty="0" smtClean="0">
+            </a:p>
+            <a:p>
+              <a:pPr marL="0" marR="0" indent="0" algn="just" defTabSz="914400" rtl="0" eaLnBrk="0" fontAlgn="base" latinLnBrk="0" hangingPunct="0">
+                <a:lnSpc>
+                  <a:spcPct val="100000"/>
+                </a:lnSpc>
+                <a:spcBef>
+                  <a:spcPct val="0"/>
+                </a:spcBef>
+                <a:spcAft>
+                  <a:spcPct val="0"/>
+                </a:spcAft>
+                <a:buClrTx/>
+                <a:buSzTx/>
+                <a:tabLst/>
+              </a:pPr>
+              <a:r>
+                <a:rPr lang="ko-KR" altLang="en-US" sz="1050" dirty="0" smtClean="0">
+                  <a:latin typeface="맑은 고딕" pitchFamily="50" charset="-127"/>
+                  <a:ea typeface="맑은 고딕" pitchFamily="50" charset="-127"/>
+                </a:rPr>
+                <a:t>해당 과목을 메인 화면에서 볼 수 있다</a:t>
+              </a:r>
+              <a:r>
+                <a:rPr lang="en-US" altLang="ko-KR" sz="1050" dirty="0" smtClean="0">
+                  <a:latin typeface="맑은 고딕" pitchFamily="50" charset="-127"/>
+                  <a:ea typeface="맑은 고딕" pitchFamily="50" charset="-127"/>
+                </a:rPr>
+                <a:t>.</a:t>
+              </a:r>
+              <a:endParaRPr kumimoji="0" lang="en-US" altLang="ko-KR" sz="1050" b="0" i="0" u="none" strike="noStrike" cap="none" normalizeH="0" baseline="0" dirty="0" smtClean="0">
+                <a:ln>
+                  <a:noFill/>
+                </a:ln>
+                <a:solidFill>
+                  <a:schemeClr val="tx1"/>
+                </a:solidFill>
+                <a:effectLst/>
                 <a:latin typeface="맑은 고딕" pitchFamily="50" charset="-127"/>
                 <a:ea typeface="맑은 고딕" pitchFamily="50" charset="-127"/>
               </a:endParaRPr>
@@ -32160,14 +33333,68 @@
                 <a:tabLst/>
               </a:pPr>
               <a:r>
-                <a:rPr kumimoji="0" lang="en-US" altLang="ko-KR" sz="1050" b="0" i="0" u="none" strike="noStrike" cap="none" normalizeH="0" baseline="0" dirty="0" smtClean="0">
-                  <a:ln>
-                    <a:noFill/>
-                  </a:ln>
-                  <a:solidFill>
-                    <a:schemeClr val="tx1"/>
-                  </a:solidFill>
-                  <a:effectLst/>
+                <a:rPr lang="ko-KR" altLang="en-US" sz="1050" dirty="0" smtClean="0">
+                  <a:latin typeface="맑은 고딕" pitchFamily="50" charset="-127"/>
+                  <a:ea typeface="맑은 고딕" pitchFamily="50" charset="-127"/>
+                </a:rPr>
+                <a:t>과목명을 입력하고 관련 정보를 새로 </a:t>
+              </a:r>
+              <a:endParaRPr lang="en-US" altLang="ko-KR" sz="1050" dirty="0" smtClean="0">
+                <a:latin typeface="맑은 고딕" pitchFamily="50" charset="-127"/>
+                <a:ea typeface="맑은 고딕" pitchFamily="50" charset="-127"/>
+              </a:endParaRPr>
+            </a:p>
+            <a:p>
+              <a:pPr marL="0" marR="0" indent="0" algn="just" defTabSz="914400" rtl="0" eaLnBrk="0" fontAlgn="base" latinLnBrk="0" hangingPunct="0">
+                <a:lnSpc>
+                  <a:spcPct val="100000"/>
+                </a:lnSpc>
+                <a:spcBef>
+                  <a:spcPct val="0"/>
+                </a:spcBef>
+                <a:spcAft>
+                  <a:spcPct val="0"/>
+                </a:spcAft>
+                <a:buClrTx/>
+                <a:buSzTx/>
+                <a:tabLst/>
+              </a:pPr>
+              <a:r>
+                <a:rPr lang="ko-KR" altLang="en-US" sz="1050" dirty="0" smtClean="0">
+                  <a:latin typeface="맑은 고딕" pitchFamily="50" charset="-127"/>
+                  <a:ea typeface="맑은 고딕" pitchFamily="50" charset="-127"/>
+                </a:rPr>
+                <a:t>입력한 후 수정 버튼을 누르면 메인 화면의</a:t>
+              </a:r>
+              <a:endParaRPr lang="en-US" altLang="ko-KR" sz="1050" dirty="0" smtClean="0">
+                <a:latin typeface="맑은 고딕" pitchFamily="50" charset="-127"/>
+                <a:ea typeface="맑은 고딕" pitchFamily="50" charset="-127"/>
+              </a:endParaRPr>
+            </a:p>
+            <a:p>
+              <a:pPr marL="0" marR="0" indent="0" algn="just" defTabSz="914400" rtl="0" eaLnBrk="0" fontAlgn="base" latinLnBrk="0" hangingPunct="0">
+                <a:lnSpc>
+                  <a:spcPct val="100000"/>
+                </a:lnSpc>
+                <a:spcBef>
+                  <a:spcPct val="0"/>
+                </a:spcBef>
+                <a:spcAft>
+                  <a:spcPct val="0"/>
+                </a:spcAft>
+                <a:buClrTx/>
+                <a:buSzTx/>
+                <a:tabLst/>
+              </a:pPr>
+              <a:r>
+                <a:rPr lang="ko-KR" altLang="en-US" sz="1050" dirty="0" smtClean="0">
+                  <a:latin typeface="맑은 고딕" pitchFamily="50" charset="-127"/>
+                  <a:ea typeface="맑은 고딕" pitchFamily="50" charset="-127"/>
+                </a:rPr>
+                <a:t>과목정보가 새롭게 갱신된다</a:t>
+              </a:r>
+              <a:r>
+                <a:rPr lang="en-US" altLang="ko-KR" sz="1050" dirty="0" smtClean="0">
                   <a:latin typeface="맑은 고딕" pitchFamily="50" charset="-127"/>
                   <a:ea typeface="맑은 고딕" pitchFamily="50" charset="-127"/>
                 </a:rPr>
@@ -32350,6 +33577,114 @@
                 </a:rPr>
                 <a:t> </a:t>
               </a:r>
+              <a:r>
+                <a:rPr lang="ko-KR" altLang="en-US" sz="1050" dirty="0" smtClean="0">
+                  <a:latin typeface="맑은 고딕" pitchFamily="50" charset="-127"/>
+                  <a:ea typeface="맑은 고딕" pitchFamily="50" charset="-127"/>
+                </a:rPr>
+                <a:t>사용자로부터 과목 명</a:t>
+              </a:r>
+              <a:r>
+                <a:rPr lang="en-US" altLang="ko-KR" sz="1050" dirty="0" smtClean="0">
+                  <a:latin typeface="맑은 고딕" pitchFamily="50" charset="-127"/>
+                  <a:ea typeface="맑은 고딕" pitchFamily="50" charset="-127"/>
+                </a:rPr>
+                <a:t>, </a:t>
+              </a:r>
+              <a:r>
+                <a:rPr lang="ko-KR" altLang="en-US" sz="1050" dirty="0" smtClean="0">
+                  <a:latin typeface="맑은 고딕" pitchFamily="50" charset="-127"/>
+                  <a:ea typeface="맑은 고딕" pitchFamily="50" charset="-127"/>
+                </a:rPr>
+                <a:t>담당교수</a:t>
+              </a:r>
+              <a:r>
+                <a:rPr lang="en-US" altLang="ko-KR" sz="1050" dirty="0" smtClean="0">
+                  <a:latin typeface="맑은 고딕" pitchFamily="50" charset="-127"/>
+                  <a:ea typeface="맑은 고딕" pitchFamily="50" charset="-127"/>
+                </a:rPr>
+                <a:t>, </a:t>
+              </a:r>
+              <a:r>
+                <a:rPr lang="ko-KR" altLang="en-US" sz="1050" dirty="0" smtClean="0">
+                  <a:latin typeface="맑은 고딕" pitchFamily="50" charset="-127"/>
+                  <a:ea typeface="맑은 고딕" pitchFamily="50" charset="-127"/>
+                </a:rPr>
+                <a:t>강의요일</a:t>
+              </a:r>
+              <a:r>
+                <a:rPr lang="en-US" altLang="ko-KR" sz="1050" dirty="0" smtClean="0">
+                  <a:latin typeface="맑은 고딕" pitchFamily="50" charset="-127"/>
+                  <a:ea typeface="맑은 고딕" pitchFamily="50" charset="-127"/>
+                </a:rPr>
+                <a:t>, </a:t>
+              </a:r>
+            </a:p>
+            <a:p>
+              <a:pPr algn="just"/>
+              <a:r>
+                <a:rPr lang="ko-KR" altLang="en-US" sz="1050" dirty="0" smtClean="0">
+                  <a:latin typeface="맑은 고딕" pitchFamily="50" charset="-127"/>
+                  <a:ea typeface="맑은 고딕" pitchFamily="50" charset="-127"/>
+                </a:rPr>
+                <a:t>강의 시작시간</a:t>
+              </a:r>
+              <a:r>
+                <a:rPr lang="en-US" altLang="ko-KR" sz="1050" dirty="0" smtClean="0">
+                  <a:latin typeface="맑은 고딕" pitchFamily="50" charset="-127"/>
+                  <a:ea typeface="맑은 고딕" pitchFamily="50" charset="-127"/>
+                </a:rPr>
+                <a:t>, </a:t>
+              </a:r>
+              <a:r>
+                <a:rPr lang="ko-KR" altLang="en-US" sz="1050" dirty="0" smtClean="0">
+                  <a:latin typeface="맑은 고딕" pitchFamily="50" charset="-127"/>
+                  <a:ea typeface="맑은 고딕" pitchFamily="50" charset="-127"/>
+                </a:rPr>
+                <a:t>강의 종료시간</a:t>
+              </a:r>
+              <a:r>
+                <a:rPr lang="en-US" altLang="ko-KR" sz="1050" dirty="0" smtClean="0">
+                  <a:latin typeface="맑은 고딕" pitchFamily="50" charset="-127"/>
+                  <a:ea typeface="맑은 고딕" pitchFamily="50" charset="-127"/>
+                </a:rPr>
+                <a:t>, </a:t>
+              </a:r>
+              <a:r>
+                <a:rPr lang="ko-KR" altLang="en-US" sz="1050" dirty="0" smtClean="0">
+                  <a:latin typeface="맑은 고딕" pitchFamily="50" charset="-127"/>
+                  <a:ea typeface="맑은 고딕" pitchFamily="50" charset="-127"/>
+                </a:rPr>
+                <a:t>수강 년도</a:t>
+              </a:r>
+              <a:r>
+                <a:rPr lang="en-US" altLang="ko-KR" sz="1050" dirty="0" smtClean="0">
+                  <a:latin typeface="맑은 고딕" pitchFamily="50" charset="-127"/>
+                  <a:ea typeface="맑은 고딕" pitchFamily="50" charset="-127"/>
+                </a:rPr>
+                <a:t>, </a:t>
+              </a:r>
+            </a:p>
+            <a:p>
+              <a:pPr algn="just"/>
+              <a:r>
+                <a:rPr lang="ko-KR" altLang="en-US" sz="1050" dirty="0" smtClean="0">
+                  <a:latin typeface="맑은 고딕" pitchFamily="50" charset="-127"/>
+                  <a:ea typeface="맑은 고딕" pitchFamily="50" charset="-127"/>
+                </a:rPr>
+                <a:t>수강학기를 입력 받는다</a:t>
+              </a:r>
+              <a:r>
+                <a:rPr lang="en-US" altLang="ko-KR" sz="1050" dirty="0" smtClean="0">
+                  <a:latin typeface="맑은 고딕" pitchFamily="50" charset="-127"/>
+                  <a:ea typeface="맑은 고딕" pitchFamily="50" charset="-127"/>
+                </a:rPr>
+                <a:t>.</a:t>
+              </a:r>
+              <a:endParaRPr lang="en-US" altLang="ko-KR" sz="1050" dirty="0">
+                <a:latin typeface="맑은 고딕" pitchFamily="50" charset="-127"/>
+                <a:ea typeface="맑은 고딕" pitchFamily="50" charset="-127"/>
+              </a:endParaRPr>
             </a:p>
             <a:p>
               <a:pPr algn="just">
@@ -32357,16 +33692,198 @@
                 <a:buChar char="•"/>
               </a:pPr>
               <a:r>
+                <a:rPr lang="ko-KR" altLang="en-US" sz="1050" dirty="0" smtClean="0">
+                  <a:latin typeface="맑은 고딕" pitchFamily="50" charset="-127"/>
+                  <a:ea typeface="맑은 고딕" pitchFamily="50" charset="-127"/>
+                </a:rPr>
+                <a:t>과목명</a:t>
+              </a:r>
+              <a:r>
+                <a:rPr lang="en-US" altLang="ko-KR" sz="1050" dirty="0" smtClean="0">
+                  <a:latin typeface="맑은 고딕" pitchFamily="50" charset="-127"/>
+                  <a:ea typeface="맑은 고딕" pitchFamily="50" charset="-127"/>
+                </a:rPr>
+                <a:t>, </a:t>
+              </a:r>
+              <a:r>
+                <a:rPr lang="ko-KR" altLang="en-US" sz="1050" dirty="0" smtClean="0">
+                  <a:latin typeface="맑은 고딕" pitchFamily="50" charset="-127"/>
+                  <a:ea typeface="맑은 고딕" pitchFamily="50" charset="-127"/>
+                </a:rPr>
+                <a:t>담당교수</a:t>
+              </a:r>
+              <a:r>
+                <a:rPr lang="en-US" altLang="ko-KR" sz="1050" dirty="0" smtClean="0">
+                  <a:latin typeface="맑은 고딕" pitchFamily="50" charset="-127"/>
+                  <a:ea typeface="맑은 고딕" pitchFamily="50" charset="-127"/>
+                </a:rPr>
+                <a:t>, </a:t>
+              </a:r>
+              <a:r>
+                <a:rPr lang="ko-KR" altLang="en-US" sz="1050" dirty="0" smtClean="0">
+                  <a:latin typeface="맑은 고딕" pitchFamily="50" charset="-127"/>
+                  <a:ea typeface="맑은 고딕" pitchFamily="50" charset="-127"/>
+                </a:rPr>
+                <a:t>수강 년도는 직접 입력</a:t>
+              </a:r>
+              <a:endParaRPr lang="en-US" altLang="ko-KR" sz="1050" dirty="0">
+                <a:latin typeface="맑은 고딕" pitchFamily="50" charset="-127"/>
+                <a:ea typeface="맑은 고딕" pitchFamily="50" charset="-127"/>
+              </a:endParaRPr>
+            </a:p>
+            <a:p>
+              <a:pPr algn="just"/>
+              <a:r>
+                <a:rPr lang="ko-KR" altLang="en-US" sz="1050" dirty="0" smtClean="0">
+                  <a:latin typeface="맑은 고딕" pitchFamily="50" charset="-127"/>
+                  <a:ea typeface="맑은 고딕" pitchFamily="50" charset="-127"/>
+                </a:rPr>
+                <a:t>받는다</a:t>
+              </a:r>
+              <a:r>
+                <a:rPr lang="en-US" altLang="ko-KR" sz="1050" dirty="0" smtClean="0">
+                  <a:latin typeface="맑은 고딕" pitchFamily="50" charset="-127"/>
+                  <a:ea typeface="맑은 고딕" pitchFamily="50" charset="-127"/>
+                </a:rPr>
+                <a:t>.</a:t>
+              </a:r>
+            </a:p>
+            <a:p>
+              <a:pPr algn="just">
+                <a:buFont typeface="Arial" pitchFamily="34" charset="0"/>
+                <a:buChar char="•"/>
+              </a:pPr>
+              <a:r>
+                <a:rPr lang="ko-KR" altLang="en-US" sz="1050" dirty="0" smtClean="0">
+                  <a:latin typeface="맑은 고딕" pitchFamily="50" charset="-127"/>
+                  <a:ea typeface="맑은 고딕" pitchFamily="50" charset="-127"/>
+                </a:rPr>
+                <a:t>강의요일</a:t>
+              </a:r>
+              <a:r>
+                <a:rPr lang="en-US" altLang="ko-KR" sz="1050" dirty="0" smtClean="0">
+                  <a:latin typeface="맑은 고딕" pitchFamily="50" charset="-127"/>
+                  <a:ea typeface="맑은 고딕" pitchFamily="50" charset="-127"/>
+                </a:rPr>
+                <a:t>, </a:t>
+              </a:r>
+              <a:r>
+                <a:rPr lang="ko-KR" altLang="en-US" sz="1050" dirty="0" smtClean="0">
+                  <a:latin typeface="맑은 고딕" pitchFamily="50" charset="-127"/>
+                  <a:ea typeface="맑은 고딕" pitchFamily="50" charset="-127"/>
+                </a:rPr>
+                <a:t>강의 시작시간</a:t>
+              </a:r>
+              <a:r>
+                <a:rPr lang="en-US" altLang="ko-KR" sz="1050" dirty="0" smtClean="0">
+                  <a:latin typeface="맑은 고딕" pitchFamily="50" charset="-127"/>
+                  <a:ea typeface="맑은 고딕" pitchFamily="50" charset="-127"/>
+                </a:rPr>
+                <a:t>, </a:t>
+              </a:r>
+              <a:r>
+                <a:rPr lang="ko-KR" altLang="en-US" sz="1050" dirty="0" smtClean="0">
+                  <a:latin typeface="맑은 고딕" pitchFamily="50" charset="-127"/>
+                  <a:ea typeface="맑은 고딕" pitchFamily="50" charset="-127"/>
+                </a:rPr>
+                <a:t>강의 종료시간</a:t>
+              </a:r>
+              <a:r>
+                <a:rPr lang="en-US" altLang="ko-KR" sz="1050" dirty="0" smtClean="0">
+                  <a:latin typeface="맑은 고딕" pitchFamily="50" charset="-127"/>
+                  <a:ea typeface="맑은 고딕" pitchFamily="50" charset="-127"/>
+                </a:rPr>
+                <a:t>, </a:t>
+              </a:r>
+            </a:p>
+            <a:p>
+              <a:pPr algn="just"/>
+              <a:r>
+                <a:rPr lang="ko-KR" altLang="en-US" sz="1050" dirty="0" smtClean="0">
+                  <a:latin typeface="맑은 고딕" pitchFamily="50" charset="-127"/>
+                  <a:ea typeface="맑은 고딕" pitchFamily="50" charset="-127"/>
+                </a:rPr>
+                <a:t>수강학기는 </a:t>
+              </a:r>
+              <a:r>
+                <a:rPr lang="ko-KR" altLang="en-US" sz="1050" dirty="0" err="1" smtClean="0">
+                  <a:latin typeface="맑은 고딕" pitchFamily="50" charset="-127"/>
+                  <a:ea typeface="맑은 고딕" pitchFamily="50" charset="-127"/>
+                </a:rPr>
+                <a:t>콤보박스로</a:t>
+              </a:r>
+              <a:r>
+                <a:rPr lang="ko-KR" altLang="en-US" sz="1050" dirty="0" smtClean="0">
+                  <a:latin typeface="맑은 고딕" pitchFamily="50" charset="-127"/>
+                  <a:ea typeface="맑은 고딕" pitchFamily="50" charset="-127"/>
+                </a:rPr>
+                <a:t> 입력 받는다</a:t>
+              </a:r>
+              <a:r>
+                <a:rPr lang="en-US" altLang="ko-KR" sz="1050" dirty="0" smtClean="0">
+                  <a:latin typeface="맑은 고딕" pitchFamily="50" charset="-127"/>
+                  <a:ea typeface="맑은 고딕" pitchFamily="50" charset="-127"/>
+                </a:rPr>
+                <a:t>.</a:t>
+              </a:r>
+            </a:p>
+            <a:p>
+              <a:pPr algn="just">
+                <a:buFont typeface="Arial" pitchFamily="34" charset="0"/>
+                <a:buChar char="•"/>
+              </a:pPr>
+              <a:r>
+                <a:rPr lang="ko-KR" altLang="en-US" sz="1050" dirty="0" smtClean="0">
+                  <a:latin typeface="맑은 고딕" pitchFamily="50" charset="-127"/>
+                  <a:ea typeface="맑은 고딕" pitchFamily="50" charset="-127"/>
+                </a:rPr>
+                <a:t>입력한 정보는 등록</a:t>
+              </a:r>
+              <a:r>
                 <a:rPr lang="en-US" altLang="ko-KR" sz="1050" dirty="0">
+                  <a:latin typeface="맑은 고딕" pitchFamily="50" charset="-127"/>
+                  <a:ea typeface="맑은 고딕" pitchFamily="50" charset="-127"/>
+                </a:rPr>
+                <a:t>,</a:t>
+              </a:r>
+              <a:r>
+                <a:rPr lang="en-US" altLang="ko-KR" sz="1050" dirty="0" smtClean="0">
                   <a:latin typeface="맑은 고딕" pitchFamily="50" charset="-127"/>
                   <a:ea typeface="맑은 고딕" pitchFamily="50" charset="-127"/>
                 </a:rPr>
                 <a:t> </a:t>
               </a:r>
-              <a:endParaRPr lang="ko-KR" altLang="en-US" sz="1050" dirty="0">
-                <a:latin typeface="맑은 고딕" pitchFamily="50" charset="-127"/>
-                <a:ea typeface="맑은 고딕" pitchFamily="50" charset="-127"/>
-              </a:endParaRPr>
+              <a:r>
+                <a:rPr lang="ko-KR" altLang="en-US" sz="1050" dirty="0" smtClean="0">
+                  <a:latin typeface="맑은 고딕" pitchFamily="50" charset="-127"/>
+                  <a:ea typeface="맑은 고딕" pitchFamily="50" charset="-127"/>
+                </a:rPr>
+                <a:t>수정 버튼으로 등록</a:t>
+              </a:r>
+              <a:r>
+                <a:rPr lang="en-US" altLang="ko-KR" sz="1050" dirty="0" smtClean="0">
+                  <a:latin typeface="맑은 고딕" pitchFamily="50" charset="-127"/>
+                  <a:ea typeface="맑은 고딕" pitchFamily="50" charset="-127"/>
+                </a:rPr>
+                <a:t>, </a:t>
+              </a:r>
+            </a:p>
+            <a:p>
+              <a:pPr algn="just"/>
+              <a:r>
+                <a:rPr lang="ko-KR" altLang="en-US" sz="1050" dirty="0" smtClean="0">
+                  <a:latin typeface="맑은 고딕" pitchFamily="50" charset="-127"/>
+                  <a:ea typeface="맑은 고딕" pitchFamily="50" charset="-127"/>
+                </a:rPr>
+                <a:t>수정한다</a:t>
+              </a:r>
+              <a:r>
+                <a:rPr lang="en-US" altLang="ko-KR" sz="1050" dirty="0" smtClean="0">
+                  <a:latin typeface="맑은 고딕" pitchFamily="50" charset="-127"/>
+                  <a:ea typeface="맑은 고딕" pitchFamily="50" charset="-127"/>
+                </a:rPr>
+                <a:t>.</a:t>
+              </a:r>
             </a:p>
           </p:txBody>
         </p:sp>
@@ -32380,7 +33897,7 @@
           <p:nvPr>
             <p:extLst>
               <p:ext uri="{D42A27DB-BD31-4B8C-83A1-F6EECF244321}">
-                <p14:modId xmlns="" xmlns:p14="http://schemas.microsoft.com/office/powerpoint/2010/main" val="91936271"/>
+                <p14:modId xmlns:p14="http://schemas.microsoft.com/office/powerpoint/2010/main" val="1582144299"/>
               </p:ext>
             </p:extLst>
           </p:nvPr>
@@ -33486,7 +35003,7 @@
                           <a:latin typeface="맑은 고딕" pitchFamily="50" charset="-127"/>
                           <a:ea typeface="맑은 고딕" pitchFamily="50" charset="-127"/>
                         </a:rPr>
-                        <a:t>20170520_01</a:t>
+                        <a:t>20170521_01</a:t>
                       </a:r>
                       <a:endParaRPr kumimoji="1" lang="ko-KR" altLang="ko-KR" sz="900" b="0" i="0" u="none" strike="noStrike" cap="none" normalizeH="0" baseline="0" dirty="0" smtClean="0">
                         <a:ln>
@@ -34153,7 +35670,7 @@
           <p:nvPr/>
         </p:nvPicPr>
         <p:blipFill>
-          <a:blip r:embed="rId2"/>
+          <a:blip r:embed="rId3"/>
           <a:srcRect/>
           <a:stretch>
             <a:fillRect/>
@@ -34173,7 +35690,7 @@
     </p:spTree>
     <p:extLst>
       <p:ext uri="{BB962C8B-B14F-4D97-AF65-F5344CB8AC3E}">
-        <p14:creationId xmlns="" xmlns:p14="http://schemas.microsoft.com/office/powerpoint/2010/main" val="4072035316"/>
+        <p14:creationId xmlns:p14="http://schemas.microsoft.com/office/powerpoint/2010/main" val="4072035316"/>
       </p:ext>
     </p:extLst>
   </p:cSld>
@@ -34216,7 +35733,7 @@
           <p:nvPr/>
         </p:nvPicPr>
         <p:blipFill>
-          <a:blip r:embed="rId2"/>
+          <a:blip r:embed="rId3"/>
           <a:srcRect/>
           <a:stretch>
             <a:fillRect/>
@@ -34266,14 +35783,14 @@
           <p:nvPr>
             <p:extLst>
               <p:ext uri="{D42A27DB-BD31-4B8C-83A1-F6EECF244321}">
-                <p14:modId xmlns="" xmlns:p14="http://schemas.microsoft.com/office/powerpoint/2010/main" val="1127966868"/>
+                <p14:modId xmlns:p14="http://schemas.microsoft.com/office/powerpoint/2010/main" val="174012501"/>
               </p:ext>
             </p:extLst>
           </p:nvPr>
         </p:nvGraphicFramePr>
         <p:xfrm>
           <a:off x="6061744" y="1203158"/>
-          <a:ext cx="2798764" cy="2265514"/>
+          <a:ext cx="2798764" cy="4849036"/>
         </p:xfrm>
         <a:graphic>
           <a:graphicData uri="http://schemas.openxmlformats.org/drawingml/2006/table">
@@ -34635,7 +36152,7 @@
                           <a:latin typeface="맑은 고딕" pitchFamily="50" charset="-127"/>
                           <a:ea typeface="맑은 고딕" pitchFamily="50" charset="-127"/>
                         </a:rPr>
-                        <a:t>아이디 입력</a:t>
+                        <a:t>과목 명 입력</a:t>
                       </a:r>
                       <a:endParaRPr lang="ko-KR" altLang="en-US" sz="1050" b="0" dirty="0">
                         <a:solidFill>
@@ -34657,64 +36174,7 @@
                     <a:bodyPr/>
                     <a:lstStyle/>
                     <a:p>
-                      <a:pPr latinLnBrk="1"/>
-                      <a:r>
-                        <a:rPr lang="en-US" altLang="ko-KR" sz="1050" b="0" baseline="0" dirty="0" smtClean="0">
-                          <a:solidFill>
-                            <a:schemeClr val="tx1"/>
-                          </a:solidFill>
-                          <a:latin typeface="맑은 고딕" pitchFamily="50" charset="-127"/>
-                          <a:ea typeface="맑은 고딕" pitchFamily="50" charset="-127"/>
-                        </a:rPr>
-                        <a:t>Text Box</a:t>
-                      </a:r>
-                    </a:p>
-                  </a:txBody>
-                  <a:tcPr anchor="ctr">
-                    <a:solidFill>
-                      <a:schemeClr val="bg1"/>
-                    </a:solidFill>
-                  </a:tcPr>
-                </a:tc>
-              </a:tr>
-              <a:tr h="430587">
-                <a:tc>
-                  <a:txBody>
-                    <a:bodyPr/>
-                    <a:lstStyle/>
-                    <a:p>
-                      <a:pPr algn="ctr" latinLnBrk="1"/>
-                      <a:r>
-                        <a:rPr lang="en-US" altLang="ko-KR" sz="1050" b="0" dirty="0" smtClean="0">
-                          <a:solidFill>
-                            <a:schemeClr val="tx1"/>
-                          </a:solidFill>
-                          <a:latin typeface="맑은 고딕" pitchFamily="50" charset="-127"/>
-                          <a:ea typeface="맑은 고딕" pitchFamily="50" charset="-127"/>
-                        </a:rPr>
-                        <a:t>2</a:t>
-                      </a:r>
-                      <a:endParaRPr lang="ko-KR" altLang="en-US" sz="1050" b="0" dirty="0">
-                        <a:solidFill>
-                          <a:schemeClr val="tx1"/>
-                        </a:solidFill>
-                        <a:latin typeface="맑은 고딕" pitchFamily="50" charset="-127"/>
-                        <a:ea typeface="맑은 고딕" pitchFamily="50" charset="-127"/>
-                      </a:endParaRPr>
-                    </a:p>
-                  </a:txBody>
-                  <a:tcPr anchor="ctr">
-                    <a:solidFill>
-                      <a:schemeClr val="bg1"/>
-                    </a:solidFill>
-                  </a:tcPr>
-                </a:tc>
-                <a:tc>
-                  <a:txBody>
-                    <a:bodyPr/>
-                    <a:lstStyle/>
-                    <a:p>
-                      <a:pPr marL="0" marR="0" indent="0" algn="ctr" defTabSz="914400" rtl="0" eaLnBrk="1" fontAlgn="auto" latinLnBrk="1" hangingPunct="1">
+                      <a:pPr marL="0" marR="0" lvl="0" indent="0" algn="l" defTabSz="914400" rtl="0" eaLnBrk="1" fontAlgn="auto" latinLnBrk="1" hangingPunct="1">
                         <a:lnSpc>
                           <a:spcPct val="100000"/>
                         </a:lnSpc>
@@ -34739,7 +36199,17 @@
                           <a:latin typeface="맑은 고딕" pitchFamily="50" charset="-127"/>
                           <a:ea typeface="맑은 고딕" pitchFamily="50" charset="-127"/>
                         </a:rPr>
-                        <a:t>I/O</a:t>
+                        <a:t>Text</a:t>
+                      </a:r>
+                      <a:r>
+                        <a:rPr lang="en-US" altLang="ko-KR" sz="1050" b="0" baseline="0" dirty="0" smtClean="0">
+                          <a:solidFill>
+                            <a:schemeClr val="tx1"/>
+                          </a:solidFill>
+                          <a:latin typeface="맑은 고딕" pitchFamily="50" charset="-127"/>
+                          <a:ea typeface="맑은 고딕" pitchFamily="50" charset="-127"/>
+                        </a:rPr>
+                        <a:t> Box</a:t>
                       </a:r>
                       <a:endParaRPr lang="ko-KR" altLang="en-US" sz="1050" b="0" dirty="0" smtClean="0">
                         <a:solidFill>
@@ -34756,11 +36226,79 @@
                     </a:solidFill>
                   </a:tcPr>
                 </a:tc>
+              </a:tr>
+              <a:tr h="430587">
                 <a:tc>
                   <a:txBody>
                     <a:bodyPr/>
                     <a:lstStyle/>
                     <a:p>
+                      <a:pPr algn="ctr"/>
+                      <a:r>
+                        <a:rPr lang="en-US" altLang="ko-KR" sz="1050" dirty="0" smtClean="0"/>
+                        <a:t>2</a:t>
+                      </a:r>
+                      <a:endParaRPr lang="ko-KR" altLang="en-US" sz="1050" dirty="0"/>
+                    </a:p>
+                  </a:txBody>
+                  <a:tcPr anchor="ctr">
+                    <a:solidFill>
+                      <a:schemeClr val="bg1"/>
+                    </a:solidFill>
+                  </a:tcPr>
+                </a:tc>
+                <a:tc>
+                  <a:txBody>
+                    <a:bodyPr/>
+                    <a:lstStyle/>
+                    <a:p>
+                      <a:pPr marL="0" marR="0" lvl="0" indent="0" algn="ctr" defTabSz="914400" rtl="0" eaLnBrk="1" fontAlgn="auto" latinLnBrk="1" hangingPunct="1">
+                        <a:lnSpc>
+                          <a:spcPct val="100000"/>
+                        </a:lnSpc>
+                        <a:spcBef>
+                          <a:spcPts val="0"/>
+                        </a:spcBef>
+                        <a:spcAft>
+                          <a:spcPts val="0"/>
+                        </a:spcAft>
+                        <a:buClrTx/>
+                        <a:buSzTx/>
+                        <a:buFontTx/>
+                        <a:buNone/>
+                        <a:tabLst/>
+                        <a:defRPr/>
+                      </a:pPr>
+                      <a:r>
+                        <a:rPr lang="en-US" altLang="ko-KR" sz="1050" b="0" dirty="0" smtClean="0">
+                          <a:solidFill>
+                            <a:schemeClr val="tx1"/>
+                          </a:solidFill>
+                          <a:latin typeface="맑은 고딕" pitchFamily="50" charset="-127"/>
+                          <a:ea typeface="맑은 고딕" pitchFamily="50" charset="-127"/>
+                        </a:rPr>
+                        <a:t>I/O</a:t>
+                      </a:r>
+                      <a:endParaRPr lang="ko-KR" altLang="en-US" sz="1050" b="0" dirty="0" smtClean="0">
+                        <a:solidFill>
+                          <a:schemeClr val="tx1"/>
+                        </a:solidFill>
+                        <a:latin typeface="맑은 고딕" pitchFamily="50" charset="-127"/>
+                        <a:ea typeface="맑은 고딕" pitchFamily="50" charset="-127"/>
+                      </a:endParaRPr>
+                    </a:p>
+                  </a:txBody>
+                  <a:tcPr anchor="ctr">
+                    <a:solidFill>
+                      <a:schemeClr val="bg1"/>
+                    </a:solidFill>
+                  </a:tcPr>
+                </a:tc>
+                <a:tc>
+                  <a:txBody>
+                    <a:bodyPr/>
+                    <a:lstStyle/>
+                    <a:p>
                       <a:pPr latinLnBrk="1"/>
                       <a:r>
                         <a:rPr lang="ko-KR" altLang="en-US" sz="1050" b="0" dirty="0" smtClean="0">
@@ -34770,7 +36308,7 @@
                           <a:latin typeface="맑은 고딕" pitchFamily="50" charset="-127"/>
                           <a:ea typeface="맑은 고딕" pitchFamily="50" charset="-127"/>
                         </a:rPr>
-                        <a:t>비밀번호 입력</a:t>
+                        <a:t>담당교수 입력</a:t>
                       </a:r>
                       <a:endParaRPr lang="ko-KR" altLang="en-US" sz="1050" b="0" dirty="0">
                         <a:solidFill>
@@ -34792,7 +36330,23 @@
                     <a:bodyPr/>
                     <a:lstStyle/>
                     <a:p>
-                      <a:pPr latinLnBrk="1"/>
+                      <a:pPr marL="0" marR="0" lvl="0" indent="0" algn="l" defTabSz="914400" rtl="0" eaLnBrk="1" fontAlgn="auto" latinLnBrk="1" hangingPunct="1">
+                        <a:lnSpc>
+                          <a:spcPct val="100000"/>
+                        </a:lnSpc>
+                        <a:spcBef>
+                          <a:spcPts val="0"/>
+                        </a:spcBef>
+                        <a:spcAft>
+                          <a:spcPts val="0"/>
+                        </a:spcAft>
+                        <a:buClrTx/>
+                        <a:buSzTx/>
+                        <a:buFontTx/>
+                        <a:buNone/>
+                        <a:tabLst/>
+                        <a:defRPr/>
+                      </a:pPr>
                       <a:r>
                         <a:rPr lang="en-US" altLang="ko-KR" sz="1050" b="0" dirty="0" smtClean="0">
                           <a:solidFill>
@@ -34812,6 +36366,39 @@
                           <a:ea typeface="맑은 고딕" pitchFamily="50" charset="-127"/>
                         </a:rPr>
                         <a:t> Box</a:t>
+                      </a:r>
+                      <a:endParaRPr lang="ko-KR" altLang="en-US" sz="1050" b="0" dirty="0" smtClean="0">
+                        <a:solidFill>
+                          <a:schemeClr val="tx1"/>
+                        </a:solidFill>
+                        <a:latin typeface="맑은 고딕" pitchFamily="50" charset="-127"/>
+                        <a:ea typeface="맑은 고딕" pitchFamily="50" charset="-127"/>
+                      </a:endParaRPr>
+                    </a:p>
+                  </a:txBody>
+                  <a:tcPr anchor="ctr">
+                    <a:solidFill>
+                      <a:schemeClr val="bg1"/>
+                    </a:solidFill>
+                  </a:tcPr>
+                </a:tc>
+              </a:tr>
+              <a:tr h="430587">
+                <a:tc>
+                  <a:txBody>
+                    <a:bodyPr/>
+                    <a:lstStyle/>
+                    <a:p>
+                      <a:pPr algn="ctr" latinLnBrk="1"/>
+                      <a:r>
+                        <a:rPr lang="en-US" altLang="ko-KR" sz="1050" b="0" dirty="0" smtClean="0">
+                          <a:solidFill>
+                            <a:schemeClr val="tx1"/>
+                          </a:solidFill>
+                          <a:latin typeface="맑은 고딕" pitchFamily="50" charset="-127"/>
+                          <a:ea typeface="맑은 고딕" pitchFamily="50" charset="-127"/>
+                        </a:rPr>
+                        <a:t>3</a:t>
                       </a:r>
                       <a:endParaRPr lang="ko-KR" altLang="en-US" sz="1050" b="0" dirty="0">
                         <a:solidFill>
@@ -34828,14 +36415,69 @@
                     </a:solidFill>
                   </a:tcPr>
                 </a:tc>
-              </a:tr>
-              <a:tr h="430587">
                 <a:tc>
                   <a:txBody>
                     <a:bodyPr/>
                     <a:lstStyle/>
                     <a:p>
-                      <a:pPr algn="ctr" latinLnBrk="1"/>
+                      <a:pPr marL="0" marR="0" lvl="0" indent="0" algn="ctr" defTabSz="914400" rtl="0" eaLnBrk="1" fontAlgn="auto" latinLnBrk="1" hangingPunct="1">
+                        <a:lnSpc>
+                          <a:spcPct val="100000"/>
+                        </a:lnSpc>
+                        <a:spcBef>
+                          <a:spcPts val="0"/>
+                        </a:spcBef>
+                        <a:spcAft>
+                          <a:spcPts val="0"/>
+                        </a:spcAft>
+                        <a:buClrTx/>
+                        <a:buSzTx/>
+                        <a:buFontTx/>
+                        <a:buNone/>
+                        <a:tabLst/>
+                        <a:defRPr/>
+                      </a:pPr>
+                      <a:r>
+                        <a:rPr lang="en-US" altLang="ko-KR" sz="1050" b="0" dirty="0" smtClean="0">
+                          <a:solidFill>
+                            <a:schemeClr val="tx1"/>
+                          </a:solidFill>
+                          <a:latin typeface="맑은 고딕" pitchFamily="50" charset="-127"/>
+                          <a:ea typeface="맑은 고딕" pitchFamily="50" charset="-127"/>
+                        </a:rPr>
+                        <a:t>I/O</a:t>
+                      </a:r>
+                      <a:endParaRPr lang="ko-KR" altLang="en-US" sz="1050" b="0" dirty="0" smtClean="0">
+                        <a:solidFill>
+                          <a:schemeClr val="tx1"/>
+                        </a:solidFill>
+                        <a:latin typeface="맑은 고딕" pitchFamily="50" charset="-127"/>
+                        <a:ea typeface="맑은 고딕" pitchFamily="50" charset="-127"/>
+                      </a:endParaRPr>
+                    </a:p>
+                  </a:txBody>
+                  <a:tcPr anchor="ctr">
+                    <a:solidFill>
+                      <a:schemeClr val="bg1"/>
+                    </a:solidFill>
+                  </a:tcPr>
+                </a:tc>
+                <a:tc>
+                  <a:txBody>
+                    <a:bodyPr/>
+                    <a:lstStyle/>
+                    <a:p>
+                      <a:pPr latinLnBrk="1"/>
+                      <a:r>
+                        <a:rPr lang="ko-KR" altLang="en-US" sz="1050" b="0" dirty="0" smtClean="0">
+                          <a:solidFill>
+                            <a:schemeClr val="tx1"/>
+                          </a:solidFill>
+                          <a:latin typeface="맑은 고딕" pitchFamily="50" charset="-127"/>
+                          <a:ea typeface="맑은 고딕" pitchFamily="50" charset="-127"/>
+                        </a:rPr>
+                        <a:t>강의요일 입력</a:t>
+                      </a:r>
                       <a:endParaRPr lang="ko-KR" altLang="en-US" sz="1050" b="0" dirty="0">
                         <a:solidFill>
                           <a:schemeClr val="tx1"/>
@@ -34856,7 +36498,76 @@
                     <a:bodyPr/>
                     <a:lstStyle/>
                     <a:p>
+                      <a:pPr marL="0" marR="0" lvl="0" indent="0" algn="l" defTabSz="914400" rtl="0" eaLnBrk="1" fontAlgn="auto" latinLnBrk="1" hangingPunct="1">
+                        <a:lnSpc>
+                          <a:spcPct val="100000"/>
+                        </a:lnSpc>
+                        <a:spcBef>
+                          <a:spcPts val="0"/>
+                        </a:spcBef>
+                        <a:spcAft>
+                          <a:spcPts val="0"/>
+                        </a:spcAft>
+                        <a:buClrTx/>
+                        <a:buSzTx/>
+                        <a:buFontTx/>
+                        <a:buNone/>
+                        <a:tabLst/>
+                        <a:defRPr/>
+                      </a:pPr>
+                      <a:r>
+                        <a:rPr lang="en-US" altLang="ko-KR" sz="1050" b="0" dirty="0" smtClean="0">
+                          <a:solidFill>
+                            <a:schemeClr val="tx1"/>
+                          </a:solidFill>
+                          <a:latin typeface="맑은 고딕" pitchFamily="50" charset="-127"/>
+                          <a:ea typeface="맑은 고딕" pitchFamily="50" charset="-127"/>
+                        </a:rPr>
+                        <a:t>Combo</a:t>
+                      </a:r>
+                      <a:r>
+                        <a:rPr lang="en-US" altLang="ko-KR" sz="1050" b="0" baseline="0" dirty="0" smtClean="0">
+                          <a:solidFill>
+                            <a:schemeClr val="tx1"/>
+                          </a:solidFill>
+                          <a:latin typeface="맑은 고딕" pitchFamily="50" charset="-127"/>
+                          <a:ea typeface="맑은 고딕" pitchFamily="50" charset="-127"/>
+                        </a:rPr>
+                        <a:t> Box</a:t>
+                      </a:r>
+                      <a:endParaRPr lang="ko-KR" altLang="en-US" sz="1050" b="0" dirty="0" smtClean="0">
+                        <a:solidFill>
+                          <a:schemeClr val="tx1"/>
+                        </a:solidFill>
+                        <a:latin typeface="맑은 고딕" pitchFamily="50" charset="-127"/>
+                        <a:ea typeface="맑은 고딕" pitchFamily="50" charset="-127"/>
+                      </a:endParaRPr>
+                    </a:p>
+                  </a:txBody>
+                  <a:tcPr anchor="ctr">
+                    <a:solidFill>
+                      <a:schemeClr val="bg1"/>
+                    </a:solidFill>
+                  </a:tcPr>
+                </a:tc>
+              </a:tr>
+              <a:tr h="430587">
+                <a:tc>
+                  <a:txBody>
+                    <a:bodyPr/>
+                    <a:lstStyle/>
+                    <a:p>
                       <a:pPr algn="ctr" latinLnBrk="1"/>
+                      <a:r>
+                        <a:rPr lang="en-US" altLang="ko-KR" sz="1050" b="0" dirty="0" smtClean="0">
+                          <a:solidFill>
+                            <a:schemeClr val="tx1"/>
+                          </a:solidFill>
+                          <a:latin typeface="맑은 고딕" pitchFamily="50" charset="-127"/>
+                          <a:ea typeface="맑은 고딕" pitchFamily="50" charset="-127"/>
+                        </a:rPr>
+                        <a:t>4</a:t>
+                      </a:r>
                       <a:endParaRPr lang="ko-KR" altLang="en-US" sz="1050" b="0" dirty="0">
                         <a:solidFill>
                           <a:schemeClr val="tx1"/>
@@ -34877,16 +36588,63 @@
                     <a:bodyPr/>
                     <a:lstStyle/>
                     <a:p>
+                      <a:pPr marL="0" marR="0" lvl="0" indent="0" algn="ctr" defTabSz="914400" rtl="0" eaLnBrk="1" fontAlgn="auto" latinLnBrk="1" hangingPunct="1">
+                        <a:lnSpc>
+                          <a:spcPct val="100000"/>
+                        </a:lnSpc>
+                        <a:spcBef>
+                          <a:spcPts val="0"/>
+                        </a:spcBef>
+                        <a:spcAft>
+                          <a:spcPts val="0"/>
+                        </a:spcAft>
+                        <a:buClrTx/>
+                        <a:buSzTx/>
+                        <a:buFontTx/>
+                        <a:buNone/>
+                        <a:tabLst/>
+                        <a:defRPr/>
+                      </a:pPr>
+                      <a:r>
+                        <a:rPr lang="en-US" altLang="ko-KR" sz="1050" b="0" dirty="0" smtClean="0">
+                          <a:solidFill>
+                            <a:schemeClr val="tx1"/>
+                          </a:solidFill>
+                          <a:latin typeface="맑은 고딕" pitchFamily="50" charset="-127"/>
+                          <a:ea typeface="맑은 고딕" pitchFamily="50" charset="-127"/>
+                        </a:rPr>
+                        <a:t>I/O</a:t>
+                      </a:r>
+                      <a:endParaRPr lang="ko-KR" altLang="en-US" sz="1050" b="0" dirty="0" smtClean="0">
+                        <a:solidFill>
+                          <a:schemeClr val="tx1"/>
+                        </a:solidFill>
+                        <a:latin typeface="맑은 고딕" pitchFamily="50" charset="-127"/>
+                        <a:ea typeface="맑은 고딕" pitchFamily="50" charset="-127"/>
+                      </a:endParaRPr>
+                    </a:p>
+                  </a:txBody>
+                  <a:tcPr anchor="ctr">
+                    <a:solidFill>
+                      <a:schemeClr val="bg1"/>
+                    </a:solidFill>
+                  </a:tcPr>
+                </a:tc>
+                <a:tc>
+                  <a:txBody>
+                    <a:bodyPr/>
+                    <a:lstStyle/>
+                    <a:p>
                       <a:pPr latinLnBrk="1"/>
                       <a:r>
-                        <a:rPr lang="en-US" altLang="ko-KR" sz="1050" b="0" dirty="0" smtClean="0">
-                          <a:solidFill>
-                            <a:schemeClr val="tx1"/>
-                          </a:solidFill>
-                          <a:latin typeface="맑은 고딕" pitchFamily="50" charset="-127"/>
-                          <a:ea typeface="맑은 고딕" pitchFamily="50" charset="-127"/>
-                        </a:rPr>
-                        <a:t>…</a:t>
+                        <a:rPr lang="ko-KR" altLang="en-US" sz="1050" b="0" dirty="0" smtClean="0">
+                          <a:solidFill>
+                            <a:schemeClr val="tx1"/>
+                          </a:solidFill>
+                          <a:latin typeface="맑은 고딕" pitchFamily="50" charset="-127"/>
+                          <a:ea typeface="맑은 고딕" pitchFamily="50" charset="-127"/>
+                        </a:rPr>
+                        <a:t>강의 시작시간 입력</a:t>
                       </a:r>
                       <a:endParaRPr lang="ko-KR" altLang="en-US" sz="1050" b="0" dirty="0">
                         <a:solidFill>
@@ -34908,7 +36666,824 @@
                     <a:bodyPr/>
                     <a:lstStyle/>
                     <a:p>
+                      <a:pPr marL="0" marR="0" lvl="0" indent="0" algn="l" defTabSz="914400" rtl="0" eaLnBrk="1" fontAlgn="auto" latinLnBrk="1" hangingPunct="1">
+                        <a:lnSpc>
+                          <a:spcPct val="100000"/>
+                        </a:lnSpc>
+                        <a:spcBef>
+                          <a:spcPts val="0"/>
+                        </a:spcBef>
+                        <a:spcAft>
+                          <a:spcPts val="0"/>
+                        </a:spcAft>
+                        <a:buClrTx/>
+                        <a:buSzTx/>
+                        <a:buFontTx/>
+                        <a:buNone/>
+                        <a:tabLst/>
+                        <a:defRPr/>
+                      </a:pPr>
+                      <a:r>
+                        <a:rPr lang="en-US" altLang="ko-KR" sz="1050" b="0" dirty="0" smtClean="0">
+                          <a:solidFill>
+                            <a:schemeClr val="tx1"/>
+                          </a:solidFill>
+                          <a:latin typeface="맑은 고딕" pitchFamily="50" charset="-127"/>
+                          <a:ea typeface="맑은 고딕" pitchFamily="50" charset="-127"/>
+                        </a:rPr>
+                        <a:t>Combo</a:t>
+                      </a:r>
+                      <a:r>
+                        <a:rPr lang="en-US" altLang="ko-KR" sz="1050" b="0" baseline="0" dirty="0" smtClean="0">
+                          <a:solidFill>
+                            <a:schemeClr val="tx1"/>
+                          </a:solidFill>
+                          <a:latin typeface="맑은 고딕" pitchFamily="50" charset="-127"/>
+                          <a:ea typeface="맑은 고딕" pitchFamily="50" charset="-127"/>
+                        </a:rPr>
+                        <a:t> Box</a:t>
+                      </a:r>
+                      <a:endParaRPr lang="ko-KR" altLang="en-US" sz="1050" b="0" dirty="0" smtClean="0">
+                        <a:solidFill>
+                          <a:schemeClr val="tx1"/>
+                        </a:solidFill>
+                        <a:latin typeface="맑은 고딕" pitchFamily="50" charset="-127"/>
+                        <a:ea typeface="맑은 고딕" pitchFamily="50" charset="-127"/>
+                      </a:endParaRPr>
+                    </a:p>
+                  </a:txBody>
+                  <a:tcPr anchor="ctr">
+                    <a:solidFill>
+                      <a:schemeClr val="bg1"/>
+                    </a:solidFill>
+                  </a:tcPr>
+                </a:tc>
+              </a:tr>
+              <a:tr h="430587">
+                <a:tc>
+                  <a:txBody>
+                    <a:bodyPr/>
+                    <a:lstStyle/>
+                    <a:p>
+                      <a:pPr algn="ctr" latinLnBrk="1"/>
+                      <a:r>
+                        <a:rPr lang="en-US" altLang="ko-KR" sz="1050" b="0" dirty="0" smtClean="0">
+                          <a:solidFill>
+                            <a:schemeClr val="tx1"/>
+                          </a:solidFill>
+                          <a:latin typeface="맑은 고딕" pitchFamily="50" charset="-127"/>
+                          <a:ea typeface="맑은 고딕" pitchFamily="50" charset="-127"/>
+                        </a:rPr>
+                        <a:t>5</a:t>
+                      </a:r>
+                      <a:endParaRPr lang="ko-KR" altLang="en-US" sz="1050" b="0" dirty="0">
+                        <a:solidFill>
+                          <a:schemeClr val="tx1"/>
+                        </a:solidFill>
+                        <a:latin typeface="맑은 고딕" pitchFamily="50" charset="-127"/>
+                        <a:ea typeface="맑은 고딕" pitchFamily="50" charset="-127"/>
+                      </a:endParaRPr>
+                    </a:p>
+                  </a:txBody>
+                  <a:tcPr anchor="ctr">
+                    <a:solidFill>
+                      <a:schemeClr val="bg1"/>
+                    </a:solidFill>
+                  </a:tcPr>
+                </a:tc>
+                <a:tc>
+                  <a:txBody>
+                    <a:bodyPr/>
+                    <a:lstStyle/>
+                    <a:p>
+                      <a:pPr marL="0" marR="0" lvl="0" indent="0" algn="ctr" defTabSz="914400" rtl="0" eaLnBrk="1" fontAlgn="auto" latinLnBrk="1" hangingPunct="1">
+                        <a:lnSpc>
+                          <a:spcPct val="100000"/>
+                        </a:lnSpc>
+                        <a:spcBef>
+                          <a:spcPts val="0"/>
+                        </a:spcBef>
+                        <a:spcAft>
+                          <a:spcPts val="0"/>
+                        </a:spcAft>
+                        <a:buClrTx/>
+                        <a:buSzTx/>
+                        <a:buFontTx/>
+                        <a:buNone/>
+                        <a:tabLst/>
+                        <a:defRPr/>
+                      </a:pPr>
+                      <a:r>
+                        <a:rPr lang="en-US" altLang="ko-KR" sz="1050" b="0" dirty="0" smtClean="0">
+                          <a:solidFill>
+                            <a:schemeClr val="tx1"/>
+                          </a:solidFill>
+                          <a:latin typeface="맑은 고딕" pitchFamily="50" charset="-127"/>
+                          <a:ea typeface="맑은 고딕" pitchFamily="50" charset="-127"/>
+                        </a:rPr>
+                        <a:t>I/O</a:t>
+                      </a:r>
+                      <a:endParaRPr lang="ko-KR" altLang="en-US" sz="1050" b="0" dirty="0" smtClean="0">
+                        <a:solidFill>
+                          <a:schemeClr val="tx1"/>
+                        </a:solidFill>
+                        <a:latin typeface="맑은 고딕" pitchFamily="50" charset="-127"/>
+                        <a:ea typeface="맑은 고딕" pitchFamily="50" charset="-127"/>
+                      </a:endParaRPr>
+                    </a:p>
+                  </a:txBody>
+                  <a:tcPr anchor="ctr">
+                    <a:solidFill>
+                      <a:schemeClr val="bg1"/>
+                    </a:solidFill>
+                  </a:tcPr>
+                </a:tc>
+                <a:tc>
+                  <a:txBody>
+                    <a:bodyPr/>
+                    <a:lstStyle/>
+                    <a:p>
                       <a:pPr latinLnBrk="1"/>
+                      <a:r>
+                        <a:rPr lang="ko-KR" altLang="en-US" sz="1050" b="0" dirty="0" smtClean="0">
+                          <a:solidFill>
+                            <a:schemeClr val="tx1"/>
+                          </a:solidFill>
+                          <a:latin typeface="맑은 고딕" pitchFamily="50" charset="-127"/>
+                          <a:ea typeface="맑은 고딕" pitchFamily="50" charset="-127"/>
+                        </a:rPr>
+                        <a:t>강의 종료시간 입력</a:t>
+                      </a:r>
+                      <a:endParaRPr lang="ko-KR" altLang="en-US" sz="1050" b="0" dirty="0">
+                        <a:solidFill>
+                          <a:schemeClr val="tx1"/>
+                        </a:solidFill>
+                        <a:latin typeface="맑은 고딕" pitchFamily="50" charset="-127"/>
+                        <a:ea typeface="맑은 고딕" pitchFamily="50" charset="-127"/>
+                      </a:endParaRPr>
+                    </a:p>
+                  </a:txBody>
+                  <a:tcPr anchor="ctr">
+                    <a:solidFill>
+                      <a:schemeClr val="bg1"/>
+                    </a:solidFill>
+                  </a:tcPr>
+                </a:tc>
+                <a:tc>
+                  <a:txBody>
+                    <a:bodyPr/>
+                    <a:lstStyle/>
+                    <a:p>
+                      <a:pPr marL="0" marR="0" lvl="0" indent="0" algn="l" defTabSz="914400" rtl="0" eaLnBrk="1" fontAlgn="auto" latinLnBrk="1" hangingPunct="1">
+                        <a:lnSpc>
+                          <a:spcPct val="100000"/>
+                        </a:lnSpc>
+                        <a:spcBef>
+                          <a:spcPts val="0"/>
+                        </a:spcBef>
+                        <a:spcAft>
+                          <a:spcPts val="0"/>
+                        </a:spcAft>
+                        <a:buClrTx/>
+                        <a:buSzTx/>
+                        <a:buFontTx/>
+                        <a:buNone/>
+                        <a:tabLst/>
+                        <a:defRPr/>
+                      </a:pPr>
+                      <a:r>
+                        <a:rPr lang="en-US" altLang="ko-KR" sz="1050" b="0" dirty="0" smtClean="0">
+                          <a:solidFill>
+                            <a:schemeClr val="tx1"/>
+                          </a:solidFill>
+                          <a:latin typeface="맑은 고딕" pitchFamily="50" charset="-127"/>
+                          <a:ea typeface="맑은 고딕" pitchFamily="50" charset="-127"/>
+                        </a:rPr>
+                        <a:t>Combo</a:t>
+                      </a:r>
+                      <a:r>
+                        <a:rPr lang="en-US" altLang="ko-KR" sz="1050" b="0" baseline="0" dirty="0" smtClean="0">
+                          <a:solidFill>
+                            <a:schemeClr val="tx1"/>
+                          </a:solidFill>
+                          <a:latin typeface="맑은 고딕" pitchFamily="50" charset="-127"/>
+                          <a:ea typeface="맑은 고딕" pitchFamily="50" charset="-127"/>
+                        </a:rPr>
+                        <a:t> Box</a:t>
+                      </a:r>
+                      <a:endParaRPr lang="ko-KR" altLang="en-US" sz="1050" b="0" dirty="0" smtClean="0">
+                        <a:solidFill>
+                          <a:schemeClr val="tx1"/>
+                        </a:solidFill>
+                        <a:latin typeface="맑은 고딕" pitchFamily="50" charset="-127"/>
+                        <a:ea typeface="맑은 고딕" pitchFamily="50" charset="-127"/>
+                      </a:endParaRPr>
+                    </a:p>
+                  </a:txBody>
+                  <a:tcPr anchor="ctr">
+                    <a:solidFill>
+                      <a:schemeClr val="bg1"/>
+                    </a:solidFill>
+                  </a:tcPr>
+                </a:tc>
+              </a:tr>
+              <a:tr h="430587">
+                <a:tc>
+                  <a:txBody>
+                    <a:bodyPr/>
+                    <a:lstStyle/>
+                    <a:p>
+                      <a:pPr algn="ctr" latinLnBrk="1"/>
+                      <a:r>
+                        <a:rPr lang="en-US" altLang="ko-KR" sz="1050" b="0" dirty="0" smtClean="0">
+                          <a:solidFill>
+                            <a:schemeClr val="tx1"/>
+                          </a:solidFill>
+                          <a:latin typeface="맑은 고딕" pitchFamily="50" charset="-127"/>
+                          <a:ea typeface="맑은 고딕" pitchFamily="50" charset="-127"/>
+                        </a:rPr>
+                        <a:t>6</a:t>
+                      </a:r>
+                      <a:endParaRPr lang="ko-KR" altLang="en-US" sz="1050" b="0" dirty="0">
+                        <a:solidFill>
+                          <a:schemeClr val="tx1"/>
+                        </a:solidFill>
+                        <a:latin typeface="맑은 고딕" pitchFamily="50" charset="-127"/>
+                        <a:ea typeface="맑은 고딕" pitchFamily="50" charset="-127"/>
+                      </a:endParaRPr>
+                    </a:p>
+                  </a:txBody>
+                  <a:tcPr anchor="ctr">
+                    <a:solidFill>
+                      <a:schemeClr val="bg1"/>
+                    </a:solidFill>
+                  </a:tcPr>
+                </a:tc>
+                <a:tc>
+                  <a:txBody>
+                    <a:bodyPr/>
+                    <a:lstStyle/>
+                    <a:p>
+                      <a:pPr marL="0" marR="0" lvl="0" indent="0" algn="ctr" defTabSz="914400" rtl="0" eaLnBrk="1" fontAlgn="auto" latinLnBrk="1" hangingPunct="1">
+                        <a:lnSpc>
+                          <a:spcPct val="100000"/>
+                        </a:lnSpc>
+                        <a:spcBef>
+                          <a:spcPts val="0"/>
+                        </a:spcBef>
+                        <a:spcAft>
+                          <a:spcPts val="0"/>
+                        </a:spcAft>
+                        <a:buClrTx/>
+                        <a:buSzTx/>
+                        <a:buFontTx/>
+                        <a:buNone/>
+                        <a:tabLst/>
+                        <a:defRPr/>
+                      </a:pPr>
+                      <a:r>
+                        <a:rPr lang="en-US" altLang="ko-KR" sz="1050" b="0" dirty="0" smtClean="0">
+                          <a:solidFill>
+                            <a:schemeClr val="tx1"/>
+                          </a:solidFill>
+                          <a:latin typeface="맑은 고딕" pitchFamily="50" charset="-127"/>
+                          <a:ea typeface="맑은 고딕" pitchFamily="50" charset="-127"/>
+                        </a:rPr>
+                        <a:t>I/O</a:t>
+                      </a:r>
+                      <a:endParaRPr lang="ko-KR" altLang="en-US" sz="1050" b="0" dirty="0" smtClean="0">
+                        <a:solidFill>
+                          <a:schemeClr val="tx1"/>
+                        </a:solidFill>
+                        <a:latin typeface="맑은 고딕" pitchFamily="50" charset="-127"/>
+                        <a:ea typeface="맑은 고딕" pitchFamily="50" charset="-127"/>
+                      </a:endParaRPr>
+                    </a:p>
+                  </a:txBody>
+                  <a:tcPr anchor="ctr">
+                    <a:solidFill>
+                      <a:schemeClr val="bg1"/>
+                    </a:solidFill>
+                  </a:tcPr>
+                </a:tc>
+                <a:tc>
+                  <a:txBody>
+                    <a:bodyPr/>
+                    <a:lstStyle/>
+                    <a:p>
+                      <a:pPr latinLnBrk="1"/>
+                      <a:r>
+                        <a:rPr lang="ko-KR" altLang="en-US" sz="1050" b="0" dirty="0" smtClean="0">
+                          <a:solidFill>
+                            <a:schemeClr val="tx1"/>
+                          </a:solidFill>
+                          <a:latin typeface="맑은 고딕" pitchFamily="50" charset="-127"/>
+                          <a:ea typeface="맑은 고딕" pitchFamily="50" charset="-127"/>
+                        </a:rPr>
+                        <a:t>수강 년도 입력</a:t>
+                      </a:r>
+                      <a:endParaRPr lang="ko-KR" altLang="en-US" sz="1050" b="0" dirty="0">
+                        <a:solidFill>
+                          <a:schemeClr val="tx1"/>
+                        </a:solidFill>
+                        <a:latin typeface="맑은 고딕" pitchFamily="50" charset="-127"/>
+                        <a:ea typeface="맑은 고딕" pitchFamily="50" charset="-127"/>
+                      </a:endParaRPr>
+                    </a:p>
+                  </a:txBody>
+                  <a:tcPr anchor="ctr">
+                    <a:solidFill>
+                      <a:schemeClr val="bg1"/>
+                    </a:solidFill>
+                  </a:tcPr>
+                </a:tc>
+                <a:tc>
+                  <a:txBody>
+                    <a:bodyPr/>
+                    <a:lstStyle/>
+                    <a:p>
+                      <a:pPr marL="0" marR="0" lvl="0" indent="0" algn="l" defTabSz="914400" rtl="0" eaLnBrk="1" fontAlgn="auto" latinLnBrk="1" hangingPunct="1">
+                        <a:lnSpc>
+                          <a:spcPct val="100000"/>
+                        </a:lnSpc>
+                        <a:spcBef>
+                          <a:spcPts val="0"/>
+                        </a:spcBef>
+                        <a:spcAft>
+                          <a:spcPts val="0"/>
+                        </a:spcAft>
+                        <a:buClrTx/>
+                        <a:buSzTx/>
+                        <a:buFontTx/>
+                        <a:buNone/>
+                        <a:tabLst/>
+                        <a:defRPr/>
+                      </a:pPr>
+                      <a:r>
+                        <a:rPr lang="en-US" altLang="ko-KR" sz="1050" b="0" dirty="0" smtClean="0">
+                          <a:solidFill>
+                            <a:schemeClr val="tx1"/>
+                          </a:solidFill>
+                          <a:latin typeface="맑은 고딕" pitchFamily="50" charset="-127"/>
+                          <a:ea typeface="맑은 고딕" pitchFamily="50" charset="-127"/>
+                        </a:rPr>
+                        <a:t>Text</a:t>
+                      </a:r>
+                      <a:r>
+                        <a:rPr lang="en-US" altLang="ko-KR" sz="1050" b="0" baseline="0" dirty="0" smtClean="0">
+                          <a:solidFill>
+                            <a:schemeClr val="tx1"/>
+                          </a:solidFill>
+                          <a:latin typeface="맑은 고딕" pitchFamily="50" charset="-127"/>
+                          <a:ea typeface="맑은 고딕" pitchFamily="50" charset="-127"/>
+                        </a:rPr>
+                        <a:t> Box</a:t>
+                      </a:r>
+                      <a:endParaRPr lang="ko-KR" altLang="en-US" sz="1050" b="0" dirty="0" smtClean="0">
+                        <a:solidFill>
+                          <a:schemeClr val="tx1"/>
+                        </a:solidFill>
+                        <a:latin typeface="맑은 고딕" pitchFamily="50" charset="-127"/>
+                        <a:ea typeface="맑은 고딕" pitchFamily="50" charset="-127"/>
+                      </a:endParaRPr>
+                    </a:p>
+                  </a:txBody>
+                  <a:tcPr anchor="ctr">
+                    <a:solidFill>
+                      <a:schemeClr val="bg1"/>
+                    </a:solidFill>
+                  </a:tcPr>
+                </a:tc>
+              </a:tr>
+              <a:tr h="430587">
+                <a:tc>
+                  <a:txBody>
+                    <a:bodyPr/>
+                    <a:lstStyle/>
+                    <a:p>
+                      <a:pPr algn="ctr" latinLnBrk="1"/>
+                      <a:r>
+                        <a:rPr lang="en-US" altLang="ko-KR" sz="1050" b="0" dirty="0" smtClean="0">
+                          <a:solidFill>
+                            <a:schemeClr val="tx1"/>
+                          </a:solidFill>
+                          <a:latin typeface="맑은 고딕" pitchFamily="50" charset="-127"/>
+                          <a:ea typeface="맑은 고딕" pitchFamily="50" charset="-127"/>
+                        </a:rPr>
+                        <a:t>7</a:t>
+                      </a:r>
+                      <a:endParaRPr lang="ko-KR" altLang="en-US" sz="1050" b="0" dirty="0">
+                        <a:solidFill>
+                          <a:schemeClr val="tx1"/>
+                        </a:solidFill>
+                        <a:latin typeface="맑은 고딕" pitchFamily="50" charset="-127"/>
+                        <a:ea typeface="맑은 고딕" pitchFamily="50" charset="-127"/>
+                      </a:endParaRPr>
+                    </a:p>
+                  </a:txBody>
+                  <a:tcPr anchor="ctr">
+                    <a:solidFill>
+                      <a:schemeClr val="bg1"/>
+                    </a:solidFill>
+                  </a:tcPr>
+                </a:tc>
+                <a:tc>
+                  <a:txBody>
+                    <a:bodyPr/>
+                    <a:lstStyle/>
+                    <a:p>
+                      <a:pPr marL="0" marR="0" lvl="0" indent="0" algn="ctr" defTabSz="914400" rtl="0" eaLnBrk="1" fontAlgn="auto" latinLnBrk="1" hangingPunct="1">
+                        <a:lnSpc>
+                          <a:spcPct val="100000"/>
+                        </a:lnSpc>
+                        <a:spcBef>
+                          <a:spcPts val="0"/>
+                        </a:spcBef>
+                        <a:spcAft>
+                          <a:spcPts val="0"/>
+                        </a:spcAft>
+                        <a:buClrTx/>
+                        <a:buSzTx/>
+                        <a:buFontTx/>
+                        <a:buNone/>
+                        <a:tabLst/>
+                        <a:defRPr/>
+                      </a:pPr>
+                      <a:r>
+                        <a:rPr lang="en-US" altLang="ko-KR" sz="1050" b="0" dirty="0" smtClean="0">
+                          <a:solidFill>
+                            <a:schemeClr val="tx1"/>
+                          </a:solidFill>
+                          <a:latin typeface="맑은 고딕" pitchFamily="50" charset="-127"/>
+                          <a:ea typeface="맑은 고딕" pitchFamily="50" charset="-127"/>
+                        </a:rPr>
+                        <a:t>I/O</a:t>
+                      </a:r>
+                    </a:p>
+                  </a:txBody>
+                  <a:tcPr anchor="ctr">
+                    <a:solidFill>
+                      <a:schemeClr val="bg1"/>
+                    </a:solidFill>
+                  </a:tcPr>
+                </a:tc>
+                <a:tc>
+                  <a:txBody>
+                    <a:bodyPr/>
+                    <a:lstStyle/>
+                    <a:p>
+                      <a:pPr latinLnBrk="1"/>
+                      <a:r>
+                        <a:rPr lang="ko-KR" altLang="en-US" sz="1050" b="0" dirty="0" smtClean="0">
+                          <a:solidFill>
+                            <a:schemeClr val="tx1"/>
+                          </a:solidFill>
+                          <a:latin typeface="맑은 고딕" pitchFamily="50" charset="-127"/>
+                          <a:ea typeface="맑은 고딕" pitchFamily="50" charset="-127"/>
+                        </a:rPr>
+                        <a:t>수강학기 입력</a:t>
+                      </a:r>
+                      <a:endParaRPr lang="ko-KR" altLang="en-US" sz="1050" b="0" dirty="0">
+                        <a:solidFill>
+                          <a:schemeClr val="tx1"/>
+                        </a:solidFill>
+                        <a:latin typeface="맑은 고딕" pitchFamily="50" charset="-127"/>
+                        <a:ea typeface="맑은 고딕" pitchFamily="50" charset="-127"/>
+                      </a:endParaRPr>
+                    </a:p>
+                  </a:txBody>
+                  <a:tcPr anchor="ctr">
+                    <a:solidFill>
+                      <a:schemeClr val="bg1"/>
+                    </a:solidFill>
+                  </a:tcPr>
+                </a:tc>
+                <a:tc>
+                  <a:txBody>
+                    <a:bodyPr/>
+                    <a:lstStyle/>
+                    <a:p>
+                      <a:pPr marL="0" marR="0" lvl="0" indent="0" algn="l" defTabSz="914400" rtl="0" eaLnBrk="1" fontAlgn="auto" latinLnBrk="1" hangingPunct="1">
+                        <a:lnSpc>
+                          <a:spcPct val="100000"/>
+                        </a:lnSpc>
+                        <a:spcBef>
+                          <a:spcPts val="0"/>
+                        </a:spcBef>
+                        <a:spcAft>
+                          <a:spcPts val="0"/>
+                        </a:spcAft>
+                        <a:buClrTx/>
+                        <a:buSzTx/>
+                        <a:buFontTx/>
+                        <a:buNone/>
+                        <a:tabLst/>
+                        <a:defRPr/>
+                      </a:pPr>
+                      <a:r>
+                        <a:rPr lang="en-US" altLang="ko-KR" sz="1050" b="0" smtClean="0">
+                          <a:solidFill>
+                            <a:schemeClr val="tx1"/>
+                          </a:solidFill>
+                          <a:latin typeface="맑은 고딕" pitchFamily="50" charset="-127"/>
+                          <a:ea typeface="맑은 고딕" pitchFamily="50" charset="-127"/>
+                        </a:rPr>
+                        <a:t>Combo</a:t>
+                      </a:r>
+                      <a:r>
+                        <a:rPr lang="en-US" altLang="ko-KR" sz="1050" b="0" baseline="0" smtClean="0">
+                          <a:solidFill>
+                            <a:schemeClr val="tx1"/>
+                          </a:solidFill>
+                          <a:latin typeface="맑은 고딕" pitchFamily="50" charset="-127"/>
+                          <a:ea typeface="맑은 고딕" pitchFamily="50" charset="-127"/>
+                        </a:rPr>
+                        <a:t> Box</a:t>
+                      </a:r>
+                      <a:endParaRPr lang="ko-KR" altLang="en-US" sz="1050" b="0" smtClean="0">
+                        <a:solidFill>
+                          <a:schemeClr val="tx1"/>
+                        </a:solidFill>
+                        <a:latin typeface="맑은 고딕" pitchFamily="50" charset="-127"/>
+                        <a:ea typeface="맑은 고딕" pitchFamily="50" charset="-127"/>
+                      </a:endParaRPr>
+                    </a:p>
+                  </a:txBody>
+                  <a:tcPr anchor="ctr">
+                    <a:solidFill>
+                      <a:schemeClr val="bg1"/>
+                    </a:solidFill>
+                  </a:tcPr>
+                </a:tc>
+              </a:tr>
+              <a:tr h="430587">
+                <a:tc>
+                  <a:txBody>
+                    <a:bodyPr/>
+                    <a:lstStyle/>
+                    <a:p>
+                      <a:pPr algn="ctr" latinLnBrk="1"/>
+                      <a:r>
+                        <a:rPr lang="en-US" altLang="ko-KR" sz="1050" b="0" dirty="0" smtClean="0">
+                          <a:solidFill>
+                            <a:schemeClr val="tx1"/>
+                          </a:solidFill>
+                          <a:latin typeface="맑은 고딕" pitchFamily="50" charset="-127"/>
+                          <a:ea typeface="맑은 고딕" pitchFamily="50" charset="-127"/>
+                        </a:rPr>
+                        <a:t>8</a:t>
+                      </a:r>
+                      <a:endParaRPr lang="ko-KR" altLang="en-US" sz="1050" b="0" dirty="0">
+                        <a:solidFill>
+                          <a:schemeClr val="tx1"/>
+                        </a:solidFill>
+                        <a:latin typeface="맑은 고딕" pitchFamily="50" charset="-127"/>
+                        <a:ea typeface="맑은 고딕" pitchFamily="50" charset="-127"/>
+                      </a:endParaRPr>
+                    </a:p>
+                  </a:txBody>
+                  <a:tcPr anchor="ctr">
+                    <a:solidFill>
+                      <a:schemeClr val="bg1"/>
+                    </a:solidFill>
+                  </a:tcPr>
+                </a:tc>
+                <a:tc>
+                  <a:txBody>
+                    <a:bodyPr/>
+                    <a:lstStyle/>
+                    <a:p>
+                      <a:pPr marL="0" marR="0" lvl="0" indent="0" algn="ctr" defTabSz="914400" rtl="0" eaLnBrk="1" fontAlgn="auto" latinLnBrk="1" hangingPunct="1">
+                        <a:lnSpc>
+                          <a:spcPct val="100000"/>
+                        </a:lnSpc>
+                        <a:spcBef>
+                          <a:spcPts val="0"/>
+                        </a:spcBef>
+                        <a:spcAft>
+                          <a:spcPts val="0"/>
+                        </a:spcAft>
+                        <a:buClrTx/>
+                        <a:buSzTx/>
+                        <a:buFontTx/>
+                        <a:buNone/>
+                        <a:tabLst/>
+                        <a:defRPr/>
+                      </a:pPr>
+                      <a:r>
+                        <a:rPr lang="en-US" altLang="ko-KR" sz="1050" b="0" dirty="0" smtClean="0">
+                          <a:solidFill>
+                            <a:schemeClr val="tx1"/>
+                          </a:solidFill>
+                          <a:latin typeface="맑은 고딕" pitchFamily="50" charset="-127"/>
+                          <a:ea typeface="맑은 고딕" pitchFamily="50" charset="-127"/>
+                        </a:rPr>
+                        <a:t>I</a:t>
+                      </a:r>
+                      <a:endParaRPr lang="ko-KR" altLang="en-US" sz="1050" b="0" dirty="0" smtClean="0">
+                        <a:solidFill>
+                          <a:schemeClr val="tx1"/>
+                        </a:solidFill>
+                        <a:latin typeface="맑은 고딕" pitchFamily="50" charset="-127"/>
+                        <a:ea typeface="맑은 고딕" pitchFamily="50" charset="-127"/>
+                      </a:endParaRPr>
+                    </a:p>
+                  </a:txBody>
+                  <a:tcPr anchor="ctr">
+                    <a:solidFill>
+                      <a:schemeClr val="bg1"/>
+                    </a:solidFill>
+                  </a:tcPr>
+                </a:tc>
+                <a:tc>
+                  <a:txBody>
+                    <a:bodyPr/>
+                    <a:lstStyle/>
+                    <a:p>
+                      <a:pPr latinLnBrk="1"/>
+                      <a:r>
+                        <a:rPr lang="ko-KR" altLang="en-US" sz="1050" b="0" dirty="0" smtClean="0">
+                          <a:solidFill>
+                            <a:schemeClr val="tx1"/>
+                          </a:solidFill>
+                          <a:latin typeface="맑은 고딕" pitchFamily="50" charset="-127"/>
+                          <a:ea typeface="맑은 고딕" pitchFamily="50" charset="-127"/>
+                        </a:rPr>
+                        <a:t>과목 등록</a:t>
+                      </a:r>
+                      <a:endParaRPr lang="ko-KR" altLang="en-US" sz="1050" b="0" dirty="0">
+                        <a:solidFill>
+                          <a:schemeClr val="tx1"/>
+                        </a:solidFill>
+                        <a:latin typeface="맑은 고딕" pitchFamily="50" charset="-127"/>
+                        <a:ea typeface="맑은 고딕" pitchFamily="50" charset="-127"/>
+                      </a:endParaRPr>
+                    </a:p>
+                  </a:txBody>
+                  <a:tcPr anchor="ctr">
+                    <a:solidFill>
+                      <a:schemeClr val="bg1"/>
+                    </a:solidFill>
+                  </a:tcPr>
+                </a:tc>
+                <a:tc>
+                  <a:txBody>
+                    <a:bodyPr/>
+                    <a:lstStyle/>
+                    <a:p>
+                      <a:pPr latinLnBrk="1"/>
+                      <a:r>
+                        <a:rPr lang="en-US" altLang="ko-KR" sz="1050" b="0" baseline="0" dirty="0" smtClean="0">
+                          <a:solidFill>
+                            <a:schemeClr val="tx1"/>
+                          </a:solidFill>
+                          <a:latin typeface="맑은 고딕" pitchFamily="50" charset="-127"/>
+                          <a:ea typeface="맑은 고딕" pitchFamily="50" charset="-127"/>
+                        </a:rPr>
+                        <a:t>Push Button</a:t>
+                      </a:r>
+                      <a:endParaRPr lang="ko-KR" altLang="en-US" sz="1050" b="0" dirty="0">
+                        <a:solidFill>
+                          <a:schemeClr val="tx1"/>
+                        </a:solidFill>
+                        <a:latin typeface="맑은 고딕" pitchFamily="50" charset="-127"/>
+                        <a:ea typeface="맑은 고딕" pitchFamily="50" charset="-127"/>
+                      </a:endParaRPr>
+                    </a:p>
+                  </a:txBody>
+                  <a:tcPr anchor="ctr">
+                    <a:solidFill>
+                      <a:schemeClr val="bg1"/>
+                    </a:solidFill>
+                  </a:tcPr>
+                </a:tc>
+              </a:tr>
+              <a:tr h="430587">
+                <a:tc>
+                  <a:txBody>
+                    <a:bodyPr/>
+                    <a:lstStyle/>
+                    <a:p>
+                      <a:pPr algn="ctr" latinLnBrk="1"/>
+                      <a:r>
+                        <a:rPr lang="en-US" altLang="ko-KR" sz="1050" b="0" dirty="0" smtClean="0">
+                          <a:solidFill>
+                            <a:schemeClr val="tx1"/>
+                          </a:solidFill>
+                          <a:latin typeface="맑은 고딕" pitchFamily="50" charset="-127"/>
+                          <a:ea typeface="맑은 고딕" pitchFamily="50" charset="-127"/>
+                        </a:rPr>
+                        <a:t>9</a:t>
+                      </a:r>
+                      <a:endParaRPr lang="ko-KR" altLang="en-US" sz="1050" b="0" dirty="0">
+                        <a:solidFill>
+                          <a:schemeClr val="tx1"/>
+                        </a:solidFill>
+                        <a:latin typeface="맑은 고딕" pitchFamily="50" charset="-127"/>
+                        <a:ea typeface="맑은 고딕" pitchFamily="50" charset="-127"/>
+                      </a:endParaRPr>
+                    </a:p>
+                  </a:txBody>
+                  <a:tcPr anchor="ctr">
+                    <a:solidFill>
+                      <a:schemeClr val="bg1"/>
+                    </a:solidFill>
+                  </a:tcPr>
+                </a:tc>
+                <a:tc>
+                  <a:txBody>
+                    <a:bodyPr/>
+                    <a:lstStyle/>
+                    <a:p>
+                      <a:pPr marL="0" marR="0" lvl="0" indent="0" algn="ctr" defTabSz="914400" rtl="0" eaLnBrk="1" fontAlgn="auto" latinLnBrk="1" hangingPunct="1">
+                        <a:lnSpc>
+                          <a:spcPct val="100000"/>
+                        </a:lnSpc>
+                        <a:spcBef>
+                          <a:spcPts val="0"/>
+                        </a:spcBef>
+                        <a:spcAft>
+                          <a:spcPts val="0"/>
+                        </a:spcAft>
+                        <a:buClrTx/>
+                        <a:buSzTx/>
+                        <a:buFontTx/>
+                        <a:buNone/>
+                        <a:tabLst/>
+                        <a:defRPr/>
+                      </a:pPr>
+                      <a:r>
+                        <a:rPr lang="en-US" altLang="ko-KR" sz="1050" b="0" dirty="0" smtClean="0">
+                          <a:solidFill>
+                            <a:schemeClr val="tx1"/>
+                          </a:solidFill>
+                          <a:latin typeface="맑은 고딕" pitchFamily="50" charset="-127"/>
+                          <a:ea typeface="맑은 고딕" pitchFamily="50" charset="-127"/>
+                        </a:rPr>
+                        <a:t>I</a:t>
+                      </a:r>
+                      <a:endParaRPr lang="ko-KR" altLang="en-US" sz="1050" b="0" dirty="0" smtClean="0">
+                        <a:solidFill>
+                          <a:schemeClr val="tx1"/>
+                        </a:solidFill>
+                        <a:latin typeface="맑은 고딕" pitchFamily="50" charset="-127"/>
+                        <a:ea typeface="맑은 고딕" pitchFamily="50" charset="-127"/>
+                      </a:endParaRPr>
+                    </a:p>
+                  </a:txBody>
+                  <a:tcPr anchor="ctr">
+                    <a:solidFill>
+                      <a:schemeClr val="bg1"/>
+                    </a:solidFill>
+                  </a:tcPr>
+                </a:tc>
+                <a:tc>
+                  <a:txBody>
+                    <a:bodyPr/>
+                    <a:lstStyle/>
+                    <a:p>
+                      <a:pPr latinLnBrk="1"/>
+                      <a:r>
+                        <a:rPr lang="ko-KR" altLang="en-US" sz="1050" b="0" dirty="0" smtClean="0">
+                          <a:solidFill>
+                            <a:schemeClr val="tx1"/>
+                          </a:solidFill>
+                          <a:latin typeface="맑은 고딕" pitchFamily="50" charset="-127"/>
+                          <a:ea typeface="맑은 고딕" pitchFamily="50" charset="-127"/>
+                        </a:rPr>
+                        <a:t>과목 수정</a:t>
+                      </a:r>
+                      <a:endParaRPr lang="ko-KR" altLang="en-US" sz="1050" b="0" dirty="0">
+                        <a:solidFill>
+                          <a:schemeClr val="tx1"/>
+                        </a:solidFill>
+                        <a:latin typeface="맑은 고딕" pitchFamily="50" charset="-127"/>
+                        <a:ea typeface="맑은 고딕" pitchFamily="50" charset="-127"/>
+                      </a:endParaRPr>
+                    </a:p>
+                  </a:txBody>
+                  <a:tcPr anchor="ctr">
+                    <a:solidFill>
+                      <a:schemeClr val="bg1"/>
+                    </a:solidFill>
+                  </a:tcPr>
+                </a:tc>
+                <a:tc>
+                  <a:txBody>
+                    <a:bodyPr/>
+                    <a:lstStyle/>
+                    <a:p>
+                      <a:pPr latinLnBrk="1"/>
+                      <a:r>
+                        <a:rPr lang="en-US" altLang="ko-KR" sz="1050" b="0" baseline="0" dirty="0" smtClean="0">
+                          <a:solidFill>
+                            <a:schemeClr val="tx1"/>
+                          </a:solidFill>
+                          <a:latin typeface="맑은 고딕" pitchFamily="50" charset="-127"/>
+                          <a:ea typeface="맑은 고딕" pitchFamily="50" charset="-127"/>
+                        </a:rPr>
+                        <a:t>Push Button</a:t>
+                      </a:r>
                       <a:endParaRPr lang="ko-KR" altLang="en-US" sz="1050" b="0" dirty="0">
                         <a:solidFill>
                           <a:schemeClr val="tx1"/>
@@ -35337,7 +37912,7 @@
           <p:nvPr>
             <p:extLst>
               <p:ext uri="{D42A27DB-BD31-4B8C-83A1-F6EECF244321}">
-                <p14:modId xmlns="" xmlns:p14="http://schemas.microsoft.com/office/powerpoint/2010/main" val="91936271"/>
+                <p14:modId xmlns:p14="http://schemas.microsoft.com/office/powerpoint/2010/main" val="741942701"/>
               </p:ext>
             </p:extLst>
           </p:nvPr>
@@ -36443,7 +39018,7 @@
                           <a:latin typeface="맑은 고딕" pitchFamily="50" charset="-127"/>
                           <a:ea typeface="맑은 고딕" pitchFamily="50" charset="-127"/>
                         </a:rPr>
-                        <a:t>20170520_01</a:t>
+                        <a:t>20170521_01</a:t>
                       </a:r>
                       <a:endParaRPr kumimoji="1" lang="ko-KR" altLang="ko-KR" sz="1000" b="0" i="0" u="none" strike="noStrike" cap="none" normalizeH="0" baseline="0" dirty="0" smtClean="0">
                         <a:ln>
@@ -37347,7 +39922,7 @@
     </p:spTree>
     <p:extLst>
       <p:ext uri="{BB962C8B-B14F-4D97-AF65-F5344CB8AC3E}">
-        <p14:creationId xmlns="" xmlns:p14="http://schemas.microsoft.com/office/powerpoint/2010/main" val="83292215"/>
+        <p14:creationId xmlns:p14="http://schemas.microsoft.com/office/powerpoint/2010/main" val="83292215"/>
       </p:ext>
     </p:extLst>
   </p:cSld>
@@ -38700,7 +41275,7 @@
           <p:nvPr>
             <p:extLst>
               <p:ext uri="{D42A27DB-BD31-4B8C-83A1-F6EECF244321}">
-                <p14:modId xmlns:p14="http://schemas.microsoft.com/office/powerpoint/2010/main" xmlns="" val="91936271"/>
+                <p14:modId xmlns:p14="http://schemas.microsoft.com/office/powerpoint/2010/main" val="2174332596"/>
               </p:ext>
             </p:extLst>
           </p:nvPr>
@@ -39821,6 +42396,7 @@
                         <a:buFontTx/>
                         <a:buNone/>
                         <a:tabLst/>
+                        <a:defRPr/>
                       </a:pPr>
                       <a:r>
                         <a:rPr kumimoji="1" lang="en-US" altLang="ko-KR" sz="1000" b="0" i="0" u="none" strike="noStrike" cap="none" normalizeH="0" baseline="0" dirty="0" smtClean="0">
@@ -39834,7 +42410,7 @@
                           <a:latin typeface="맑은 고딕" pitchFamily="50" charset="-127"/>
                           <a:ea typeface="맑은 고딕" pitchFamily="50" charset="-127"/>
                         </a:rPr>
-                        <a:t>20170520_01</a:t>
+                        <a:t>20170521_01</a:t>
                       </a:r>
                       <a:endParaRPr kumimoji="1" lang="ko-KR" altLang="ko-KR" sz="1000" b="0" i="0" u="none" strike="noStrike" cap="none" normalizeH="0" baseline="0" dirty="0" smtClean="0">
                         <a:ln>
@@ -40521,7 +43097,7 @@
     </p:spTree>
     <p:extLst>
       <p:ext uri="{BB962C8B-B14F-4D97-AF65-F5344CB8AC3E}">
-        <p14:creationId xmlns:p14="http://schemas.microsoft.com/office/powerpoint/2010/main" xmlns="" val="4072035316"/>
+        <p14:creationId xmlns:p14="http://schemas.microsoft.com/office/powerpoint/2010/main" val="4072035316"/>
       </p:ext>
     </p:extLst>
   </p:cSld>

</xml_diff>